<commit_message>
feat: adicionar campo de local de emissão e melhorar formatação de data e hora nos certificados
</commit_message>
<xml_diff>
--- a/public/templates/frente-verso-2a.pptx
+++ b/public/templates/frente-verso-2a.pptx
@@ -113,981 +113,10 @@
 <file path=ppt/revisionInfo.xml><?xml version="1.0" encoding="utf-8"?>
 <p1510:revInfo xmlns:a="http://schemas.openxmlformats.org/drawingml/2006/main" xmlns:r="http://schemas.openxmlformats.org/officeDocument/2006/relationships" xmlns:p1510="http://schemas.microsoft.com/office/powerpoint/2015/10/main">
   <p1510:revLst>
-    <p1510:client id="{1E735FCB-970C-4D14-B4B3-E5D05BF44C66}" v="27" dt="2024-11-27T18:21:39.827"/>
-    <p1510:client id="{F1D889FE-CC1A-488F-BDA3-3AE183C0B615}" v="8" dt="2024-11-27T17:53:52.538"/>
+    <p1510:client id="{EA9CA41D-5676-4B16-B365-FD2B3B4CFE7B}" v="63" dt="2024-12-18T14:45:07.264"/>
+    <p1510:client id="{ECA3990B-D76C-4346-B91E-69C766162F4E}" v="48" dt="2024-12-18T14:07:42.439"/>
   </p1510:revLst>
 </p1510:revInfo>
-</file>
-
-<file path=ppt/changesInfos/changesInfo1.xml><?xml version="1.0" encoding="utf-8"?>
-<pc:chgInfo xmlns:a="http://schemas.openxmlformats.org/drawingml/2006/main" xmlns:r="http://schemas.openxmlformats.org/officeDocument/2006/relationships" xmlns:ac="http://schemas.microsoft.com/office/drawing/2013/main/command" xmlns:pc="http://schemas.microsoft.com/office/powerpoint/2013/main/command">
-  <pc:docChgLst>
-    <pc:chgData name="Pedro Samuel" userId="70e97cf450802abf" providerId="Windows Live" clId="Web-{F1D889FE-CC1A-488F-BDA3-3AE183C0B615}"/>
-    <pc:docChg chg="modSld delMainMaster">
-      <pc:chgData name="Pedro Samuel" userId="70e97cf450802abf" providerId="Windows Live" clId="Web-{F1D889FE-CC1A-488F-BDA3-3AE183C0B615}" dt="2024-11-27T17:53:52.538" v="63" actId="20577"/>
-      <pc:docMkLst>
-        <pc:docMk/>
-      </pc:docMkLst>
-      <pc:sldChg chg="modSp">
-        <pc:chgData name="Pedro Samuel" userId="70e97cf450802abf" providerId="Windows Live" clId="Web-{F1D889FE-CC1A-488F-BDA3-3AE183C0B615}" dt="2024-11-27T17:53:52.538" v="63" actId="20577"/>
-        <pc:sldMkLst>
-          <pc:docMk/>
-          <pc:sldMk cId="0" sldId="257"/>
-        </pc:sldMkLst>
-        <pc:spChg chg="mod">
-          <ac:chgData name="Pedro Samuel" userId="70e97cf450802abf" providerId="Windows Live" clId="Web-{F1D889FE-CC1A-488F-BDA3-3AE183C0B615}" dt="2024-11-27T17:53:46.928" v="60" actId="20577"/>
-          <ac:spMkLst>
-            <pc:docMk/>
-            <pc:sldMk cId="0" sldId="257"/>
-            <ac:spMk id="408" creationId="{00000000-0000-0000-0000-000000000000}"/>
-          </ac:spMkLst>
-        </pc:spChg>
-        <pc:spChg chg="mod">
-          <ac:chgData name="Pedro Samuel" userId="70e97cf450802abf" providerId="Windows Live" clId="Web-{F1D889FE-CC1A-488F-BDA3-3AE183C0B615}" dt="2024-11-27T17:53:52.538" v="63" actId="20577"/>
-          <ac:spMkLst>
-            <pc:docMk/>
-            <pc:sldMk cId="0" sldId="257"/>
-            <ac:spMk id="409" creationId="{00000000-0000-0000-0000-000000000000}"/>
-          </ac:spMkLst>
-        </pc:spChg>
-      </pc:sldChg>
-      <pc:sldMasterChg chg="del delSldLayout">
-        <pc:chgData name="Pedro Samuel" userId="70e97cf450802abf" providerId="Windows Live" clId="Web-{F1D889FE-CC1A-488F-BDA3-3AE183C0B615}" dt="2024-11-27T17:53:41.100" v="2"/>
-        <pc:sldMasterMkLst>
-          <pc:docMk/>
-          <pc:sldMasterMk cId="0" sldId="2147483650"/>
-        </pc:sldMasterMkLst>
-        <pc:sldLayoutChg chg="del">
-          <pc:chgData name="Pedro Samuel" userId="70e97cf450802abf" providerId="Windows Live" clId="Web-{F1D889FE-CC1A-488F-BDA3-3AE183C0B615}" dt="2024-11-27T17:53:41.100" v="2"/>
-          <pc:sldLayoutMkLst>
-            <pc:docMk/>
-            <pc:sldMasterMk cId="0" sldId="2147483650"/>
-            <pc:sldLayoutMk cId="0" sldId="2147483651"/>
-          </pc:sldLayoutMkLst>
-        </pc:sldLayoutChg>
-      </pc:sldMasterChg>
-      <pc:sldMasterChg chg="del delSldLayout">
-        <pc:chgData name="Pedro Samuel" userId="70e97cf450802abf" providerId="Windows Live" clId="Web-{F1D889FE-CC1A-488F-BDA3-3AE183C0B615}" dt="2024-11-27T17:53:41.100" v="3"/>
-        <pc:sldMasterMkLst>
-          <pc:docMk/>
-          <pc:sldMasterMk cId="0" sldId="2147483652"/>
-        </pc:sldMasterMkLst>
-        <pc:sldLayoutChg chg="del">
-          <pc:chgData name="Pedro Samuel" userId="70e97cf450802abf" providerId="Windows Live" clId="Web-{F1D889FE-CC1A-488F-BDA3-3AE183C0B615}" dt="2024-11-27T17:53:41.100" v="3"/>
-          <pc:sldLayoutMkLst>
-            <pc:docMk/>
-            <pc:sldMasterMk cId="0" sldId="2147483652"/>
-            <pc:sldLayoutMk cId="0" sldId="2147483653"/>
-          </pc:sldLayoutMkLst>
-        </pc:sldLayoutChg>
-      </pc:sldMasterChg>
-      <pc:sldMasterChg chg="del delSldLayout">
-        <pc:chgData name="Pedro Samuel" userId="70e97cf450802abf" providerId="Windows Live" clId="Web-{F1D889FE-CC1A-488F-BDA3-3AE183C0B615}" dt="2024-11-27T17:53:41.100" v="4"/>
-        <pc:sldMasterMkLst>
-          <pc:docMk/>
-          <pc:sldMasterMk cId="0" sldId="2147483654"/>
-        </pc:sldMasterMkLst>
-        <pc:sldLayoutChg chg="del">
-          <pc:chgData name="Pedro Samuel" userId="70e97cf450802abf" providerId="Windows Live" clId="Web-{F1D889FE-CC1A-488F-BDA3-3AE183C0B615}" dt="2024-11-27T17:53:41.100" v="4"/>
-          <pc:sldLayoutMkLst>
-            <pc:docMk/>
-            <pc:sldMasterMk cId="0" sldId="2147483654"/>
-            <pc:sldLayoutMk cId="0" sldId="2147483655"/>
-          </pc:sldLayoutMkLst>
-        </pc:sldLayoutChg>
-      </pc:sldMasterChg>
-      <pc:sldMasterChg chg="del delSldLayout">
-        <pc:chgData name="Pedro Samuel" userId="70e97cf450802abf" providerId="Windows Live" clId="Web-{F1D889FE-CC1A-488F-BDA3-3AE183C0B615}" dt="2024-11-27T17:53:41.100" v="5"/>
-        <pc:sldMasterMkLst>
-          <pc:docMk/>
-          <pc:sldMasterMk cId="0" sldId="2147483656"/>
-        </pc:sldMasterMkLst>
-        <pc:sldLayoutChg chg="del">
-          <pc:chgData name="Pedro Samuel" userId="70e97cf450802abf" providerId="Windows Live" clId="Web-{F1D889FE-CC1A-488F-BDA3-3AE183C0B615}" dt="2024-11-27T17:53:41.100" v="5"/>
-          <pc:sldLayoutMkLst>
-            <pc:docMk/>
-            <pc:sldMasterMk cId="0" sldId="2147483656"/>
-            <pc:sldLayoutMk cId="0" sldId="2147483657"/>
-          </pc:sldLayoutMkLst>
-        </pc:sldLayoutChg>
-      </pc:sldMasterChg>
-      <pc:sldMasterChg chg="del delSldLayout">
-        <pc:chgData name="Pedro Samuel" userId="70e97cf450802abf" providerId="Windows Live" clId="Web-{F1D889FE-CC1A-488F-BDA3-3AE183C0B615}" dt="2024-11-27T17:53:41.100" v="6"/>
-        <pc:sldMasterMkLst>
-          <pc:docMk/>
-          <pc:sldMasterMk cId="0" sldId="2147483658"/>
-        </pc:sldMasterMkLst>
-        <pc:sldLayoutChg chg="del">
-          <pc:chgData name="Pedro Samuel" userId="70e97cf450802abf" providerId="Windows Live" clId="Web-{F1D889FE-CC1A-488F-BDA3-3AE183C0B615}" dt="2024-11-27T17:53:41.100" v="6"/>
-          <pc:sldLayoutMkLst>
-            <pc:docMk/>
-            <pc:sldMasterMk cId="0" sldId="2147483658"/>
-            <pc:sldLayoutMk cId="0" sldId="2147483659"/>
-          </pc:sldLayoutMkLst>
-        </pc:sldLayoutChg>
-      </pc:sldMasterChg>
-      <pc:sldMasterChg chg="del delSldLayout">
-        <pc:chgData name="Pedro Samuel" userId="70e97cf450802abf" providerId="Windows Live" clId="Web-{F1D889FE-CC1A-488F-BDA3-3AE183C0B615}" dt="2024-11-27T17:53:41.100" v="7"/>
-        <pc:sldMasterMkLst>
-          <pc:docMk/>
-          <pc:sldMasterMk cId="0" sldId="2147483660"/>
-        </pc:sldMasterMkLst>
-        <pc:sldLayoutChg chg="del">
-          <pc:chgData name="Pedro Samuel" userId="70e97cf450802abf" providerId="Windows Live" clId="Web-{F1D889FE-CC1A-488F-BDA3-3AE183C0B615}" dt="2024-11-27T17:53:41.100" v="7"/>
-          <pc:sldLayoutMkLst>
-            <pc:docMk/>
-            <pc:sldMasterMk cId="0" sldId="2147483660"/>
-            <pc:sldLayoutMk cId="0" sldId="2147483661"/>
-          </pc:sldLayoutMkLst>
-        </pc:sldLayoutChg>
-      </pc:sldMasterChg>
-      <pc:sldMasterChg chg="del delSldLayout">
-        <pc:chgData name="Pedro Samuel" userId="70e97cf450802abf" providerId="Windows Live" clId="Web-{F1D889FE-CC1A-488F-BDA3-3AE183C0B615}" dt="2024-11-27T17:53:41.100" v="8"/>
-        <pc:sldMasterMkLst>
-          <pc:docMk/>
-          <pc:sldMasterMk cId="0" sldId="2147483662"/>
-        </pc:sldMasterMkLst>
-        <pc:sldLayoutChg chg="del">
-          <pc:chgData name="Pedro Samuel" userId="70e97cf450802abf" providerId="Windows Live" clId="Web-{F1D889FE-CC1A-488F-BDA3-3AE183C0B615}" dt="2024-11-27T17:53:41.100" v="8"/>
-          <pc:sldLayoutMkLst>
-            <pc:docMk/>
-            <pc:sldMasterMk cId="0" sldId="2147483662"/>
-            <pc:sldLayoutMk cId="0" sldId="2147483663"/>
-          </pc:sldLayoutMkLst>
-        </pc:sldLayoutChg>
-      </pc:sldMasterChg>
-      <pc:sldMasterChg chg="del delSldLayout">
-        <pc:chgData name="Pedro Samuel" userId="70e97cf450802abf" providerId="Windows Live" clId="Web-{F1D889FE-CC1A-488F-BDA3-3AE183C0B615}" dt="2024-11-27T17:53:41.100" v="9"/>
-        <pc:sldMasterMkLst>
-          <pc:docMk/>
-          <pc:sldMasterMk cId="0" sldId="2147483664"/>
-        </pc:sldMasterMkLst>
-        <pc:sldLayoutChg chg="del">
-          <pc:chgData name="Pedro Samuel" userId="70e97cf450802abf" providerId="Windows Live" clId="Web-{F1D889FE-CC1A-488F-BDA3-3AE183C0B615}" dt="2024-11-27T17:53:41.100" v="9"/>
-          <pc:sldLayoutMkLst>
-            <pc:docMk/>
-            <pc:sldMasterMk cId="0" sldId="2147483664"/>
-            <pc:sldLayoutMk cId="0" sldId="2147483665"/>
-          </pc:sldLayoutMkLst>
-        </pc:sldLayoutChg>
-      </pc:sldMasterChg>
-      <pc:sldMasterChg chg="del delSldLayout">
-        <pc:chgData name="Pedro Samuel" userId="70e97cf450802abf" providerId="Windows Live" clId="Web-{F1D889FE-CC1A-488F-BDA3-3AE183C0B615}" dt="2024-11-27T17:53:41.100" v="10"/>
-        <pc:sldMasterMkLst>
-          <pc:docMk/>
-          <pc:sldMasterMk cId="0" sldId="2147483666"/>
-        </pc:sldMasterMkLst>
-        <pc:sldLayoutChg chg="del">
-          <pc:chgData name="Pedro Samuel" userId="70e97cf450802abf" providerId="Windows Live" clId="Web-{F1D889FE-CC1A-488F-BDA3-3AE183C0B615}" dt="2024-11-27T17:53:41.100" v="10"/>
-          <pc:sldLayoutMkLst>
-            <pc:docMk/>
-            <pc:sldMasterMk cId="0" sldId="2147483666"/>
-            <pc:sldLayoutMk cId="0" sldId="2147483667"/>
-          </pc:sldLayoutMkLst>
-        </pc:sldLayoutChg>
-      </pc:sldMasterChg>
-      <pc:sldMasterChg chg="del delSldLayout">
-        <pc:chgData name="Pedro Samuel" userId="70e97cf450802abf" providerId="Windows Live" clId="Web-{F1D889FE-CC1A-488F-BDA3-3AE183C0B615}" dt="2024-11-27T17:53:41.100" v="11"/>
-        <pc:sldMasterMkLst>
-          <pc:docMk/>
-          <pc:sldMasterMk cId="0" sldId="2147483668"/>
-        </pc:sldMasterMkLst>
-        <pc:sldLayoutChg chg="del">
-          <pc:chgData name="Pedro Samuel" userId="70e97cf450802abf" providerId="Windows Live" clId="Web-{F1D889FE-CC1A-488F-BDA3-3AE183C0B615}" dt="2024-11-27T17:53:41.100" v="11"/>
-          <pc:sldLayoutMkLst>
-            <pc:docMk/>
-            <pc:sldMasterMk cId="0" sldId="2147483668"/>
-            <pc:sldLayoutMk cId="0" sldId="2147483669"/>
-          </pc:sldLayoutMkLst>
-        </pc:sldLayoutChg>
-      </pc:sldMasterChg>
-      <pc:sldMasterChg chg="del delSldLayout">
-        <pc:chgData name="Pedro Samuel" userId="70e97cf450802abf" providerId="Windows Live" clId="Web-{F1D889FE-CC1A-488F-BDA3-3AE183C0B615}" dt="2024-11-27T17:53:41.100" v="12"/>
-        <pc:sldMasterMkLst>
-          <pc:docMk/>
-          <pc:sldMasterMk cId="0" sldId="2147483670"/>
-        </pc:sldMasterMkLst>
-        <pc:sldLayoutChg chg="del">
-          <pc:chgData name="Pedro Samuel" userId="70e97cf450802abf" providerId="Windows Live" clId="Web-{F1D889FE-CC1A-488F-BDA3-3AE183C0B615}" dt="2024-11-27T17:53:41.100" v="12"/>
-          <pc:sldLayoutMkLst>
-            <pc:docMk/>
-            <pc:sldMasterMk cId="0" sldId="2147483670"/>
-            <pc:sldLayoutMk cId="0" sldId="2147483671"/>
-          </pc:sldLayoutMkLst>
-        </pc:sldLayoutChg>
-      </pc:sldMasterChg>
-      <pc:sldMasterChg chg="del delSldLayout">
-        <pc:chgData name="Pedro Samuel" userId="70e97cf450802abf" providerId="Windows Live" clId="Web-{F1D889FE-CC1A-488F-BDA3-3AE183C0B615}" dt="2024-11-27T17:53:41.100" v="13"/>
-        <pc:sldMasterMkLst>
-          <pc:docMk/>
-          <pc:sldMasterMk cId="0" sldId="2147483672"/>
-        </pc:sldMasterMkLst>
-        <pc:sldLayoutChg chg="del">
-          <pc:chgData name="Pedro Samuel" userId="70e97cf450802abf" providerId="Windows Live" clId="Web-{F1D889FE-CC1A-488F-BDA3-3AE183C0B615}" dt="2024-11-27T17:53:41.100" v="13"/>
-          <pc:sldLayoutMkLst>
-            <pc:docMk/>
-            <pc:sldMasterMk cId="0" sldId="2147483672"/>
-            <pc:sldLayoutMk cId="0" sldId="2147483673"/>
-          </pc:sldLayoutMkLst>
-        </pc:sldLayoutChg>
-      </pc:sldMasterChg>
-      <pc:sldMasterChg chg="del delSldLayout">
-        <pc:chgData name="Pedro Samuel" userId="70e97cf450802abf" providerId="Windows Live" clId="Web-{F1D889FE-CC1A-488F-BDA3-3AE183C0B615}" dt="2024-11-27T17:53:41.100" v="14"/>
-        <pc:sldMasterMkLst>
-          <pc:docMk/>
-          <pc:sldMasterMk cId="0" sldId="2147483676"/>
-        </pc:sldMasterMkLst>
-        <pc:sldLayoutChg chg="del">
-          <pc:chgData name="Pedro Samuel" userId="70e97cf450802abf" providerId="Windows Live" clId="Web-{F1D889FE-CC1A-488F-BDA3-3AE183C0B615}" dt="2024-11-27T17:53:41.100" v="14"/>
-          <pc:sldLayoutMkLst>
-            <pc:docMk/>
-            <pc:sldMasterMk cId="0" sldId="2147483676"/>
-            <pc:sldLayoutMk cId="0" sldId="2147483677"/>
-          </pc:sldLayoutMkLst>
-        </pc:sldLayoutChg>
-      </pc:sldMasterChg>
-      <pc:sldMasterChg chg="del delSldLayout">
-        <pc:chgData name="Pedro Samuel" userId="70e97cf450802abf" providerId="Windows Live" clId="Web-{F1D889FE-CC1A-488F-BDA3-3AE183C0B615}" dt="2024-11-27T17:53:41.100" v="15"/>
-        <pc:sldMasterMkLst>
-          <pc:docMk/>
-          <pc:sldMasterMk cId="0" sldId="2147483678"/>
-        </pc:sldMasterMkLst>
-        <pc:sldLayoutChg chg="del">
-          <pc:chgData name="Pedro Samuel" userId="70e97cf450802abf" providerId="Windows Live" clId="Web-{F1D889FE-CC1A-488F-BDA3-3AE183C0B615}" dt="2024-11-27T17:53:41.100" v="15"/>
-          <pc:sldLayoutMkLst>
-            <pc:docMk/>
-            <pc:sldMasterMk cId="0" sldId="2147483678"/>
-            <pc:sldLayoutMk cId="0" sldId="2147483679"/>
-          </pc:sldLayoutMkLst>
-        </pc:sldLayoutChg>
-      </pc:sldMasterChg>
-      <pc:sldMasterChg chg="del delSldLayout">
-        <pc:chgData name="Pedro Samuel" userId="70e97cf450802abf" providerId="Windows Live" clId="Web-{F1D889FE-CC1A-488F-BDA3-3AE183C0B615}" dt="2024-11-27T17:53:41.100" v="16"/>
-        <pc:sldMasterMkLst>
-          <pc:docMk/>
-          <pc:sldMasterMk cId="0" sldId="2147483680"/>
-        </pc:sldMasterMkLst>
-        <pc:sldLayoutChg chg="del">
-          <pc:chgData name="Pedro Samuel" userId="70e97cf450802abf" providerId="Windows Live" clId="Web-{F1D889FE-CC1A-488F-BDA3-3AE183C0B615}" dt="2024-11-27T17:53:41.100" v="16"/>
-          <pc:sldLayoutMkLst>
-            <pc:docMk/>
-            <pc:sldMasterMk cId="0" sldId="2147483680"/>
-            <pc:sldLayoutMk cId="0" sldId="2147483681"/>
-          </pc:sldLayoutMkLst>
-        </pc:sldLayoutChg>
-      </pc:sldMasterChg>
-      <pc:sldMasterChg chg="del delSldLayout">
-        <pc:chgData name="Pedro Samuel" userId="70e97cf450802abf" providerId="Windows Live" clId="Web-{F1D889FE-CC1A-488F-BDA3-3AE183C0B615}" dt="2024-11-27T17:53:41.100" v="17"/>
-        <pc:sldMasterMkLst>
-          <pc:docMk/>
-          <pc:sldMasterMk cId="0" sldId="2147483682"/>
-        </pc:sldMasterMkLst>
-        <pc:sldLayoutChg chg="del">
-          <pc:chgData name="Pedro Samuel" userId="70e97cf450802abf" providerId="Windows Live" clId="Web-{F1D889FE-CC1A-488F-BDA3-3AE183C0B615}" dt="2024-11-27T17:53:41.100" v="17"/>
-          <pc:sldLayoutMkLst>
-            <pc:docMk/>
-            <pc:sldMasterMk cId="0" sldId="2147483682"/>
-            <pc:sldLayoutMk cId="0" sldId="2147483683"/>
-          </pc:sldLayoutMkLst>
-        </pc:sldLayoutChg>
-      </pc:sldMasterChg>
-      <pc:sldMasterChg chg="del delSldLayout">
-        <pc:chgData name="Pedro Samuel" userId="70e97cf450802abf" providerId="Windows Live" clId="Web-{F1D889FE-CC1A-488F-BDA3-3AE183C0B615}" dt="2024-11-27T17:53:41.100" v="18"/>
-        <pc:sldMasterMkLst>
-          <pc:docMk/>
-          <pc:sldMasterMk cId="0" sldId="2147483684"/>
-        </pc:sldMasterMkLst>
-        <pc:sldLayoutChg chg="del">
-          <pc:chgData name="Pedro Samuel" userId="70e97cf450802abf" providerId="Windows Live" clId="Web-{F1D889FE-CC1A-488F-BDA3-3AE183C0B615}" dt="2024-11-27T17:53:41.100" v="18"/>
-          <pc:sldLayoutMkLst>
-            <pc:docMk/>
-            <pc:sldMasterMk cId="0" sldId="2147483684"/>
-            <pc:sldLayoutMk cId="0" sldId="2147483685"/>
-          </pc:sldLayoutMkLst>
-        </pc:sldLayoutChg>
-      </pc:sldMasterChg>
-      <pc:sldMasterChg chg="del delSldLayout">
-        <pc:chgData name="Pedro Samuel" userId="70e97cf450802abf" providerId="Windows Live" clId="Web-{F1D889FE-CC1A-488F-BDA3-3AE183C0B615}" dt="2024-11-27T17:53:41.100" v="19"/>
-        <pc:sldMasterMkLst>
-          <pc:docMk/>
-          <pc:sldMasterMk cId="0" sldId="2147483686"/>
-        </pc:sldMasterMkLst>
-        <pc:sldLayoutChg chg="del">
-          <pc:chgData name="Pedro Samuel" userId="70e97cf450802abf" providerId="Windows Live" clId="Web-{F1D889FE-CC1A-488F-BDA3-3AE183C0B615}" dt="2024-11-27T17:53:41.100" v="19"/>
-          <pc:sldLayoutMkLst>
-            <pc:docMk/>
-            <pc:sldMasterMk cId="0" sldId="2147483686"/>
-            <pc:sldLayoutMk cId="0" sldId="2147483687"/>
-          </pc:sldLayoutMkLst>
-        </pc:sldLayoutChg>
-      </pc:sldMasterChg>
-      <pc:sldMasterChg chg="del delSldLayout">
-        <pc:chgData name="Pedro Samuel" userId="70e97cf450802abf" providerId="Windows Live" clId="Web-{F1D889FE-CC1A-488F-BDA3-3AE183C0B615}" dt="2024-11-27T17:53:41.100" v="20"/>
-        <pc:sldMasterMkLst>
-          <pc:docMk/>
-          <pc:sldMasterMk cId="0" sldId="2147483688"/>
-        </pc:sldMasterMkLst>
-        <pc:sldLayoutChg chg="del">
-          <pc:chgData name="Pedro Samuel" userId="70e97cf450802abf" providerId="Windows Live" clId="Web-{F1D889FE-CC1A-488F-BDA3-3AE183C0B615}" dt="2024-11-27T17:53:41.100" v="20"/>
-          <pc:sldLayoutMkLst>
-            <pc:docMk/>
-            <pc:sldMasterMk cId="0" sldId="2147483688"/>
-            <pc:sldLayoutMk cId="0" sldId="2147483689"/>
-          </pc:sldLayoutMkLst>
-        </pc:sldLayoutChg>
-      </pc:sldMasterChg>
-      <pc:sldMasterChg chg="del delSldLayout">
-        <pc:chgData name="Pedro Samuel" userId="70e97cf450802abf" providerId="Windows Live" clId="Web-{F1D889FE-CC1A-488F-BDA3-3AE183C0B615}" dt="2024-11-27T17:53:41.100" v="21"/>
-        <pc:sldMasterMkLst>
-          <pc:docMk/>
-          <pc:sldMasterMk cId="0" sldId="2147483690"/>
-        </pc:sldMasterMkLst>
-        <pc:sldLayoutChg chg="del">
-          <pc:chgData name="Pedro Samuel" userId="70e97cf450802abf" providerId="Windows Live" clId="Web-{F1D889FE-CC1A-488F-BDA3-3AE183C0B615}" dt="2024-11-27T17:53:41.100" v="21"/>
-          <pc:sldLayoutMkLst>
-            <pc:docMk/>
-            <pc:sldMasterMk cId="0" sldId="2147483690"/>
-            <pc:sldLayoutMk cId="0" sldId="2147483691"/>
-          </pc:sldLayoutMkLst>
-        </pc:sldLayoutChg>
-      </pc:sldMasterChg>
-      <pc:sldMasterChg chg="del delSldLayout">
-        <pc:chgData name="Pedro Samuel" userId="70e97cf450802abf" providerId="Windows Live" clId="Web-{F1D889FE-CC1A-488F-BDA3-3AE183C0B615}" dt="2024-11-27T17:53:41.100" v="22"/>
-        <pc:sldMasterMkLst>
-          <pc:docMk/>
-          <pc:sldMasterMk cId="0" sldId="2147483692"/>
-        </pc:sldMasterMkLst>
-        <pc:sldLayoutChg chg="del">
-          <pc:chgData name="Pedro Samuel" userId="70e97cf450802abf" providerId="Windows Live" clId="Web-{F1D889FE-CC1A-488F-BDA3-3AE183C0B615}" dt="2024-11-27T17:53:41.100" v="22"/>
-          <pc:sldLayoutMkLst>
-            <pc:docMk/>
-            <pc:sldMasterMk cId="0" sldId="2147483692"/>
-            <pc:sldLayoutMk cId="0" sldId="2147483693"/>
-          </pc:sldLayoutMkLst>
-        </pc:sldLayoutChg>
-      </pc:sldMasterChg>
-      <pc:sldMasterChg chg="del delSldLayout">
-        <pc:chgData name="Pedro Samuel" userId="70e97cf450802abf" providerId="Windows Live" clId="Web-{F1D889FE-CC1A-488F-BDA3-3AE183C0B615}" dt="2024-11-27T17:53:41.100" v="23"/>
-        <pc:sldMasterMkLst>
-          <pc:docMk/>
-          <pc:sldMasterMk cId="0" sldId="2147483694"/>
-        </pc:sldMasterMkLst>
-        <pc:sldLayoutChg chg="del">
-          <pc:chgData name="Pedro Samuel" userId="70e97cf450802abf" providerId="Windows Live" clId="Web-{F1D889FE-CC1A-488F-BDA3-3AE183C0B615}" dt="2024-11-27T17:53:41.100" v="23"/>
-          <pc:sldLayoutMkLst>
-            <pc:docMk/>
-            <pc:sldMasterMk cId="0" sldId="2147483694"/>
-            <pc:sldLayoutMk cId="0" sldId="2147483695"/>
-          </pc:sldLayoutMkLst>
-        </pc:sldLayoutChg>
-      </pc:sldMasterChg>
-      <pc:sldMasterChg chg="del delSldLayout">
-        <pc:chgData name="Pedro Samuel" userId="70e97cf450802abf" providerId="Windows Live" clId="Web-{F1D889FE-CC1A-488F-BDA3-3AE183C0B615}" dt="2024-11-27T17:53:41.100" v="24"/>
-        <pc:sldMasterMkLst>
-          <pc:docMk/>
-          <pc:sldMasterMk cId="0" sldId="2147483696"/>
-        </pc:sldMasterMkLst>
-        <pc:sldLayoutChg chg="del">
-          <pc:chgData name="Pedro Samuel" userId="70e97cf450802abf" providerId="Windows Live" clId="Web-{F1D889FE-CC1A-488F-BDA3-3AE183C0B615}" dt="2024-11-27T17:53:41.100" v="24"/>
-          <pc:sldLayoutMkLst>
-            <pc:docMk/>
-            <pc:sldMasterMk cId="0" sldId="2147483696"/>
-            <pc:sldLayoutMk cId="0" sldId="2147483697"/>
-          </pc:sldLayoutMkLst>
-        </pc:sldLayoutChg>
-      </pc:sldMasterChg>
-      <pc:sldMasterChg chg="del delSldLayout">
-        <pc:chgData name="Pedro Samuel" userId="70e97cf450802abf" providerId="Windows Live" clId="Web-{F1D889FE-CC1A-488F-BDA3-3AE183C0B615}" dt="2024-11-27T17:53:41.100" v="25"/>
-        <pc:sldMasterMkLst>
-          <pc:docMk/>
-          <pc:sldMasterMk cId="0" sldId="2147483698"/>
-        </pc:sldMasterMkLst>
-        <pc:sldLayoutChg chg="del">
-          <pc:chgData name="Pedro Samuel" userId="70e97cf450802abf" providerId="Windows Live" clId="Web-{F1D889FE-CC1A-488F-BDA3-3AE183C0B615}" dt="2024-11-27T17:53:41.100" v="25"/>
-          <pc:sldLayoutMkLst>
-            <pc:docMk/>
-            <pc:sldMasterMk cId="0" sldId="2147483698"/>
-            <pc:sldLayoutMk cId="0" sldId="2147483699"/>
-          </pc:sldLayoutMkLst>
-        </pc:sldLayoutChg>
-      </pc:sldMasterChg>
-      <pc:sldMasterChg chg="del delSldLayout">
-        <pc:chgData name="Pedro Samuel" userId="70e97cf450802abf" providerId="Windows Live" clId="Web-{F1D889FE-CC1A-488F-BDA3-3AE183C0B615}" dt="2024-11-27T17:53:41.100" v="26"/>
-        <pc:sldMasterMkLst>
-          <pc:docMk/>
-          <pc:sldMasterMk cId="0" sldId="2147483700"/>
-        </pc:sldMasterMkLst>
-        <pc:sldLayoutChg chg="del">
-          <pc:chgData name="Pedro Samuel" userId="70e97cf450802abf" providerId="Windows Live" clId="Web-{F1D889FE-CC1A-488F-BDA3-3AE183C0B615}" dt="2024-11-27T17:53:41.100" v="26"/>
-          <pc:sldLayoutMkLst>
-            <pc:docMk/>
-            <pc:sldMasterMk cId="0" sldId="2147483700"/>
-            <pc:sldLayoutMk cId="0" sldId="2147483701"/>
-          </pc:sldLayoutMkLst>
-        </pc:sldLayoutChg>
-      </pc:sldMasterChg>
-      <pc:sldMasterChg chg="del delSldLayout">
-        <pc:chgData name="Pedro Samuel" userId="70e97cf450802abf" providerId="Windows Live" clId="Web-{F1D889FE-CC1A-488F-BDA3-3AE183C0B615}" dt="2024-11-27T17:53:41.100" v="27"/>
-        <pc:sldMasterMkLst>
-          <pc:docMk/>
-          <pc:sldMasterMk cId="0" sldId="2147483702"/>
-        </pc:sldMasterMkLst>
-        <pc:sldLayoutChg chg="del">
-          <pc:chgData name="Pedro Samuel" userId="70e97cf450802abf" providerId="Windows Live" clId="Web-{F1D889FE-CC1A-488F-BDA3-3AE183C0B615}" dt="2024-11-27T17:53:41.100" v="27"/>
-          <pc:sldLayoutMkLst>
-            <pc:docMk/>
-            <pc:sldMasterMk cId="0" sldId="2147483702"/>
-            <pc:sldLayoutMk cId="0" sldId="2147483703"/>
-          </pc:sldLayoutMkLst>
-        </pc:sldLayoutChg>
-      </pc:sldMasterChg>
-      <pc:sldMasterChg chg="del delSldLayout">
-        <pc:chgData name="Pedro Samuel" userId="70e97cf450802abf" providerId="Windows Live" clId="Web-{F1D889FE-CC1A-488F-BDA3-3AE183C0B615}" dt="2024-11-27T17:53:41.100" v="28"/>
-        <pc:sldMasterMkLst>
-          <pc:docMk/>
-          <pc:sldMasterMk cId="0" sldId="2147483704"/>
-        </pc:sldMasterMkLst>
-        <pc:sldLayoutChg chg="del">
-          <pc:chgData name="Pedro Samuel" userId="70e97cf450802abf" providerId="Windows Live" clId="Web-{F1D889FE-CC1A-488F-BDA3-3AE183C0B615}" dt="2024-11-27T17:53:41.100" v="28"/>
-          <pc:sldLayoutMkLst>
-            <pc:docMk/>
-            <pc:sldMasterMk cId="0" sldId="2147483704"/>
-            <pc:sldLayoutMk cId="0" sldId="2147483705"/>
-          </pc:sldLayoutMkLst>
-        </pc:sldLayoutChg>
-      </pc:sldMasterChg>
-      <pc:sldMasterChg chg="del delSldLayout">
-        <pc:chgData name="Pedro Samuel" userId="70e97cf450802abf" providerId="Windows Live" clId="Web-{F1D889FE-CC1A-488F-BDA3-3AE183C0B615}" dt="2024-11-27T17:53:41.100" v="29"/>
-        <pc:sldMasterMkLst>
-          <pc:docMk/>
-          <pc:sldMasterMk cId="0" sldId="2147483706"/>
-        </pc:sldMasterMkLst>
-        <pc:sldLayoutChg chg="del">
-          <pc:chgData name="Pedro Samuel" userId="70e97cf450802abf" providerId="Windows Live" clId="Web-{F1D889FE-CC1A-488F-BDA3-3AE183C0B615}" dt="2024-11-27T17:53:41.100" v="29"/>
-          <pc:sldLayoutMkLst>
-            <pc:docMk/>
-            <pc:sldMasterMk cId="0" sldId="2147483706"/>
-            <pc:sldLayoutMk cId="0" sldId="2147483707"/>
-          </pc:sldLayoutMkLst>
-        </pc:sldLayoutChg>
-      </pc:sldMasterChg>
-      <pc:sldMasterChg chg="del delSldLayout">
-        <pc:chgData name="Pedro Samuel" userId="70e97cf450802abf" providerId="Windows Live" clId="Web-{F1D889FE-CC1A-488F-BDA3-3AE183C0B615}" dt="2024-11-27T17:53:41.100" v="30"/>
-        <pc:sldMasterMkLst>
-          <pc:docMk/>
-          <pc:sldMasterMk cId="0" sldId="2147483708"/>
-        </pc:sldMasterMkLst>
-        <pc:sldLayoutChg chg="del">
-          <pc:chgData name="Pedro Samuel" userId="70e97cf450802abf" providerId="Windows Live" clId="Web-{F1D889FE-CC1A-488F-BDA3-3AE183C0B615}" dt="2024-11-27T17:53:41.100" v="30"/>
-          <pc:sldLayoutMkLst>
-            <pc:docMk/>
-            <pc:sldMasterMk cId="0" sldId="2147483708"/>
-            <pc:sldLayoutMk cId="0" sldId="2147483709"/>
-          </pc:sldLayoutMkLst>
-        </pc:sldLayoutChg>
-      </pc:sldMasterChg>
-      <pc:sldMasterChg chg="del delSldLayout">
-        <pc:chgData name="Pedro Samuel" userId="70e97cf450802abf" providerId="Windows Live" clId="Web-{F1D889FE-CC1A-488F-BDA3-3AE183C0B615}" dt="2024-11-27T17:53:41.100" v="31"/>
-        <pc:sldMasterMkLst>
-          <pc:docMk/>
-          <pc:sldMasterMk cId="0" sldId="2147483710"/>
-        </pc:sldMasterMkLst>
-        <pc:sldLayoutChg chg="del">
-          <pc:chgData name="Pedro Samuel" userId="70e97cf450802abf" providerId="Windows Live" clId="Web-{F1D889FE-CC1A-488F-BDA3-3AE183C0B615}" dt="2024-11-27T17:53:41.100" v="31"/>
-          <pc:sldLayoutMkLst>
-            <pc:docMk/>
-            <pc:sldMasterMk cId="0" sldId="2147483710"/>
-            <pc:sldLayoutMk cId="0" sldId="2147483711"/>
-          </pc:sldLayoutMkLst>
-        </pc:sldLayoutChg>
-      </pc:sldMasterChg>
-      <pc:sldMasterChg chg="del delSldLayout">
-        <pc:chgData name="Pedro Samuel" userId="70e97cf450802abf" providerId="Windows Live" clId="Web-{F1D889FE-CC1A-488F-BDA3-3AE183C0B615}" dt="2024-11-27T17:53:41.100" v="32"/>
-        <pc:sldMasterMkLst>
-          <pc:docMk/>
-          <pc:sldMasterMk cId="0" sldId="2147483712"/>
-        </pc:sldMasterMkLst>
-        <pc:sldLayoutChg chg="del">
-          <pc:chgData name="Pedro Samuel" userId="70e97cf450802abf" providerId="Windows Live" clId="Web-{F1D889FE-CC1A-488F-BDA3-3AE183C0B615}" dt="2024-11-27T17:53:41.100" v="32"/>
-          <pc:sldLayoutMkLst>
-            <pc:docMk/>
-            <pc:sldMasterMk cId="0" sldId="2147483712"/>
-            <pc:sldLayoutMk cId="0" sldId="2147483713"/>
-          </pc:sldLayoutMkLst>
-        </pc:sldLayoutChg>
-      </pc:sldMasterChg>
-      <pc:sldMasterChg chg="del delSldLayout">
-        <pc:chgData name="Pedro Samuel" userId="70e97cf450802abf" providerId="Windows Live" clId="Web-{F1D889FE-CC1A-488F-BDA3-3AE183C0B615}" dt="2024-11-27T17:53:41.100" v="33"/>
-        <pc:sldMasterMkLst>
-          <pc:docMk/>
-          <pc:sldMasterMk cId="0" sldId="2147483714"/>
-        </pc:sldMasterMkLst>
-        <pc:sldLayoutChg chg="del">
-          <pc:chgData name="Pedro Samuel" userId="70e97cf450802abf" providerId="Windows Live" clId="Web-{F1D889FE-CC1A-488F-BDA3-3AE183C0B615}" dt="2024-11-27T17:53:41.100" v="33"/>
-          <pc:sldLayoutMkLst>
-            <pc:docMk/>
-            <pc:sldMasterMk cId="0" sldId="2147483714"/>
-            <pc:sldLayoutMk cId="0" sldId="2147483715"/>
-          </pc:sldLayoutMkLst>
-        </pc:sldLayoutChg>
-      </pc:sldMasterChg>
-      <pc:sldMasterChg chg="del delSldLayout">
-        <pc:chgData name="Pedro Samuel" userId="70e97cf450802abf" providerId="Windows Live" clId="Web-{F1D889FE-CC1A-488F-BDA3-3AE183C0B615}" dt="2024-11-27T17:53:41.100" v="34"/>
-        <pc:sldMasterMkLst>
-          <pc:docMk/>
-          <pc:sldMasterMk cId="0" sldId="2147483716"/>
-        </pc:sldMasterMkLst>
-        <pc:sldLayoutChg chg="del">
-          <pc:chgData name="Pedro Samuel" userId="70e97cf450802abf" providerId="Windows Live" clId="Web-{F1D889FE-CC1A-488F-BDA3-3AE183C0B615}" dt="2024-11-27T17:53:41.100" v="34"/>
-          <pc:sldLayoutMkLst>
-            <pc:docMk/>
-            <pc:sldMasterMk cId="0" sldId="2147483716"/>
-            <pc:sldLayoutMk cId="0" sldId="2147483717"/>
-          </pc:sldLayoutMkLst>
-        </pc:sldLayoutChg>
-      </pc:sldMasterChg>
-      <pc:sldMasterChg chg="del delSldLayout">
-        <pc:chgData name="Pedro Samuel" userId="70e97cf450802abf" providerId="Windows Live" clId="Web-{F1D889FE-CC1A-488F-BDA3-3AE183C0B615}" dt="2024-11-27T17:53:41.100" v="35"/>
-        <pc:sldMasterMkLst>
-          <pc:docMk/>
-          <pc:sldMasterMk cId="0" sldId="2147483718"/>
-        </pc:sldMasterMkLst>
-        <pc:sldLayoutChg chg="del">
-          <pc:chgData name="Pedro Samuel" userId="70e97cf450802abf" providerId="Windows Live" clId="Web-{F1D889FE-CC1A-488F-BDA3-3AE183C0B615}" dt="2024-11-27T17:53:41.100" v="35"/>
-          <pc:sldLayoutMkLst>
-            <pc:docMk/>
-            <pc:sldMasterMk cId="0" sldId="2147483718"/>
-            <pc:sldLayoutMk cId="0" sldId="2147483719"/>
-          </pc:sldLayoutMkLst>
-        </pc:sldLayoutChg>
-      </pc:sldMasterChg>
-      <pc:sldMasterChg chg="del delSldLayout">
-        <pc:chgData name="Pedro Samuel" userId="70e97cf450802abf" providerId="Windows Live" clId="Web-{F1D889FE-CC1A-488F-BDA3-3AE183C0B615}" dt="2024-11-27T17:53:41.100" v="36"/>
-        <pc:sldMasterMkLst>
-          <pc:docMk/>
-          <pc:sldMasterMk cId="0" sldId="2147483720"/>
-        </pc:sldMasterMkLst>
-        <pc:sldLayoutChg chg="del">
-          <pc:chgData name="Pedro Samuel" userId="70e97cf450802abf" providerId="Windows Live" clId="Web-{F1D889FE-CC1A-488F-BDA3-3AE183C0B615}" dt="2024-11-27T17:53:41.100" v="36"/>
-          <pc:sldLayoutMkLst>
-            <pc:docMk/>
-            <pc:sldMasterMk cId="0" sldId="2147483720"/>
-            <pc:sldLayoutMk cId="0" sldId="2147483721"/>
-          </pc:sldLayoutMkLst>
-        </pc:sldLayoutChg>
-      </pc:sldMasterChg>
-      <pc:sldMasterChg chg="del delSldLayout">
-        <pc:chgData name="Pedro Samuel" userId="70e97cf450802abf" providerId="Windows Live" clId="Web-{F1D889FE-CC1A-488F-BDA3-3AE183C0B615}" dt="2024-11-27T17:53:41.100" v="37"/>
-        <pc:sldMasterMkLst>
-          <pc:docMk/>
-          <pc:sldMasterMk cId="0" sldId="2147483722"/>
-        </pc:sldMasterMkLst>
-        <pc:sldLayoutChg chg="del">
-          <pc:chgData name="Pedro Samuel" userId="70e97cf450802abf" providerId="Windows Live" clId="Web-{F1D889FE-CC1A-488F-BDA3-3AE183C0B615}" dt="2024-11-27T17:53:41.100" v="37"/>
-          <pc:sldLayoutMkLst>
-            <pc:docMk/>
-            <pc:sldMasterMk cId="0" sldId="2147483722"/>
-            <pc:sldLayoutMk cId="0" sldId="2147483723"/>
-          </pc:sldLayoutMkLst>
-        </pc:sldLayoutChg>
-      </pc:sldMasterChg>
-      <pc:sldMasterChg chg="del delSldLayout">
-        <pc:chgData name="Pedro Samuel" userId="70e97cf450802abf" providerId="Windows Live" clId="Web-{F1D889FE-CC1A-488F-BDA3-3AE183C0B615}" dt="2024-11-27T17:53:41.100" v="38"/>
-        <pc:sldMasterMkLst>
-          <pc:docMk/>
-          <pc:sldMasterMk cId="0" sldId="2147483724"/>
-        </pc:sldMasterMkLst>
-        <pc:sldLayoutChg chg="del">
-          <pc:chgData name="Pedro Samuel" userId="70e97cf450802abf" providerId="Windows Live" clId="Web-{F1D889FE-CC1A-488F-BDA3-3AE183C0B615}" dt="2024-11-27T17:53:41.100" v="38"/>
-          <pc:sldLayoutMkLst>
-            <pc:docMk/>
-            <pc:sldMasterMk cId="0" sldId="2147483724"/>
-            <pc:sldLayoutMk cId="0" sldId="2147483725"/>
-          </pc:sldLayoutMkLst>
-        </pc:sldLayoutChg>
-      </pc:sldMasterChg>
-      <pc:sldMasterChg chg="del delSldLayout">
-        <pc:chgData name="Pedro Samuel" userId="70e97cf450802abf" providerId="Windows Live" clId="Web-{F1D889FE-CC1A-488F-BDA3-3AE183C0B615}" dt="2024-11-27T17:53:41.100" v="39"/>
-        <pc:sldMasterMkLst>
-          <pc:docMk/>
-          <pc:sldMasterMk cId="0" sldId="2147483726"/>
-        </pc:sldMasterMkLst>
-        <pc:sldLayoutChg chg="del">
-          <pc:chgData name="Pedro Samuel" userId="70e97cf450802abf" providerId="Windows Live" clId="Web-{F1D889FE-CC1A-488F-BDA3-3AE183C0B615}" dt="2024-11-27T17:53:41.100" v="39"/>
-          <pc:sldLayoutMkLst>
-            <pc:docMk/>
-            <pc:sldMasterMk cId="0" sldId="2147483726"/>
-            <pc:sldLayoutMk cId="0" sldId="2147483727"/>
-          </pc:sldLayoutMkLst>
-        </pc:sldLayoutChg>
-      </pc:sldMasterChg>
-      <pc:sldMasterChg chg="del delSldLayout">
-        <pc:chgData name="Pedro Samuel" userId="70e97cf450802abf" providerId="Windows Live" clId="Web-{F1D889FE-CC1A-488F-BDA3-3AE183C0B615}" dt="2024-11-27T17:53:41.100" v="40"/>
-        <pc:sldMasterMkLst>
-          <pc:docMk/>
-          <pc:sldMasterMk cId="0" sldId="2147483728"/>
-        </pc:sldMasterMkLst>
-        <pc:sldLayoutChg chg="del">
-          <pc:chgData name="Pedro Samuel" userId="70e97cf450802abf" providerId="Windows Live" clId="Web-{F1D889FE-CC1A-488F-BDA3-3AE183C0B615}" dt="2024-11-27T17:53:41.100" v="40"/>
-          <pc:sldLayoutMkLst>
-            <pc:docMk/>
-            <pc:sldMasterMk cId="0" sldId="2147483728"/>
-            <pc:sldLayoutMk cId="0" sldId="2147483729"/>
-          </pc:sldLayoutMkLst>
-        </pc:sldLayoutChg>
-      </pc:sldMasterChg>
-      <pc:sldMasterChg chg="del delSldLayout">
-        <pc:chgData name="Pedro Samuel" userId="70e97cf450802abf" providerId="Windows Live" clId="Web-{F1D889FE-CC1A-488F-BDA3-3AE183C0B615}" dt="2024-11-27T17:53:41.100" v="41"/>
-        <pc:sldMasterMkLst>
-          <pc:docMk/>
-          <pc:sldMasterMk cId="0" sldId="2147483730"/>
-        </pc:sldMasterMkLst>
-        <pc:sldLayoutChg chg="del">
-          <pc:chgData name="Pedro Samuel" userId="70e97cf450802abf" providerId="Windows Live" clId="Web-{F1D889FE-CC1A-488F-BDA3-3AE183C0B615}" dt="2024-11-27T17:53:41.100" v="41"/>
-          <pc:sldLayoutMkLst>
-            <pc:docMk/>
-            <pc:sldMasterMk cId="0" sldId="2147483730"/>
-            <pc:sldLayoutMk cId="0" sldId="2147483731"/>
-          </pc:sldLayoutMkLst>
-        </pc:sldLayoutChg>
-      </pc:sldMasterChg>
-      <pc:sldMasterChg chg="del delSldLayout">
-        <pc:chgData name="Pedro Samuel" userId="70e97cf450802abf" providerId="Windows Live" clId="Web-{F1D889FE-CC1A-488F-BDA3-3AE183C0B615}" dt="2024-11-27T17:53:41.100" v="42"/>
-        <pc:sldMasterMkLst>
-          <pc:docMk/>
-          <pc:sldMasterMk cId="0" sldId="2147483732"/>
-        </pc:sldMasterMkLst>
-        <pc:sldLayoutChg chg="del">
-          <pc:chgData name="Pedro Samuel" userId="70e97cf450802abf" providerId="Windows Live" clId="Web-{F1D889FE-CC1A-488F-BDA3-3AE183C0B615}" dt="2024-11-27T17:53:41.100" v="42"/>
-          <pc:sldLayoutMkLst>
-            <pc:docMk/>
-            <pc:sldMasterMk cId="0" sldId="2147483732"/>
-            <pc:sldLayoutMk cId="0" sldId="2147483733"/>
-          </pc:sldLayoutMkLst>
-        </pc:sldLayoutChg>
-      </pc:sldMasterChg>
-      <pc:sldMasterChg chg="del delSldLayout">
-        <pc:chgData name="Pedro Samuel" userId="70e97cf450802abf" providerId="Windows Live" clId="Web-{F1D889FE-CC1A-488F-BDA3-3AE183C0B615}" dt="2024-11-27T17:53:41.100" v="43"/>
-        <pc:sldMasterMkLst>
-          <pc:docMk/>
-          <pc:sldMasterMk cId="0" sldId="2147483734"/>
-        </pc:sldMasterMkLst>
-        <pc:sldLayoutChg chg="del">
-          <pc:chgData name="Pedro Samuel" userId="70e97cf450802abf" providerId="Windows Live" clId="Web-{F1D889FE-CC1A-488F-BDA3-3AE183C0B615}" dt="2024-11-27T17:53:41.100" v="43"/>
-          <pc:sldLayoutMkLst>
-            <pc:docMk/>
-            <pc:sldMasterMk cId="0" sldId="2147483734"/>
-            <pc:sldLayoutMk cId="0" sldId="2147483735"/>
-          </pc:sldLayoutMkLst>
-        </pc:sldLayoutChg>
-      </pc:sldMasterChg>
-      <pc:sldMasterChg chg="del delSldLayout">
-        <pc:chgData name="Pedro Samuel" userId="70e97cf450802abf" providerId="Windows Live" clId="Web-{F1D889FE-CC1A-488F-BDA3-3AE183C0B615}" dt="2024-11-27T17:53:41.116" v="44"/>
-        <pc:sldMasterMkLst>
-          <pc:docMk/>
-          <pc:sldMasterMk cId="0" sldId="2147483736"/>
-        </pc:sldMasterMkLst>
-        <pc:sldLayoutChg chg="del">
-          <pc:chgData name="Pedro Samuel" userId="70e97cf450802abf" providerId="Windows Live" clId="Web-{F1D889FE-CC1A-488F-BDA3-3AE183C0B615}" dt="2024-11-27T17:53:41.116" v="44"/>
-          <pc:sldLayoutMkLst>
-            <pc:docMk/>
-            <pc:sldMasterMk cId="0" sldId="2147483736"/>
-            <pc:sldLayoutMk cId="0" sldId="2147483737"/>
-          </pc:sldLayoutMkLst>
-        </pc:sldLayoutChg>
-      </pc:sldMasterChg>
-      <pc:sldMasterChg chg="del delSldLayout">
-        <pc:chgData name="Pedro Samuel" userId="70e97cf450802abf" providerId="Windows Live" clId="Web-{F1D889FE-CC1A-488F-BDA3-3AE183C0B615}" dt="2024-11-27T17:53:41.116" v="45"/>
-        <pc:sldMasterMkLst>
-          <pc:docMk/>
-          <pc:sldMasterMk cId="0" sldId="2147483738"/>
-        </pc:sldMasterMkLst>
-        <pc:sldLayoutChg chg="del">
-          <pc:chgData name="Pedro Samuel" userId="70e97cf450802abf" providerId="Windows Live" clId="Web-{F1D889FE-CC1A-488F-BDA3-3AE183C0B615}" dt="2024-11-27T17:53:41.116" v="45"/>
-          <pc:sldLayoutMkLst>
-            <pc:docMk/>
-            <pc:sldMasterMk cId="0" sldId="2147483738"/>
-            <pc:sldLayoutMk cId="0" sldId="2147483739"/>
-          </pc:sldLayoutMkLst>
-        </pc:sldLayoutChg>
-      </pc:sldMasterChg>
-      <pc:sldMasterChg chg="del delSldLayout">
-        <pc:chgData name="Pedro Samuel" userId="70e97cf450802abf" providerId="Windows Live" clId="Web-{F1D889FE-CC1A-488F-BDA3-3AE183C0B615}" dt="2024-11-27T17:53:41.116" v="46"/>
-        <pc:sldMasterMkLst>
-          <pc:docMk/>
-          <pc:sldMasterMk cId="0" sldId="2147483740"/>
-        </pc:sldMasterMkLst>
-        <pc:sldLayoutChg chg="del">
-          <pc:chgData name="Pedro Samuel" userId="70e97cf450802abf" providerId="Windows Live" clId="Web-{F1D889FE-CC1A-488F-BDA3-3AE183C0B615}" dt="2024-11-27T17:53:41.116" v="46"/>
-          <pc:sldLayoutMkLst>
-            <pc:docMk/>
-            <pc:sldMasterMk cId="0" sldId="2147483740"/>
-            <pc:sldLayoutMk cId="0" sldId="2147483741"/>
-          </pc:sldLayoutMkLst>
-        </pc:sldLayoutChg>
-      </pc:sldMasterChg>
-      <pc:sldMasterChg chg="del delSldLayout">
-        <pc:chgData name="Pedro Samuel" userId="70e97cf450802abf" providerId="Windows Live" clId="Web-{F1D889FE-CC1A-488F-BDA3-3AE183C0B615}" dt="2024-11-27T17:53:41.116" v="47"/>
-        <pc:sldMasterMkLst>
-          <pc:docMk/>
-          <pc:sldMasterMk cId="0" sldId="2147483742"/>
-        </pc:sldMasterMkLst>
-        <pc:sldLayoutChg chg="del">
-          <pc:chgData name="Pedro Samuel" userId="70e97cf450802abf" providerId="Windows Live" clId="Web-{F1D889FE-CC1A-488F-BDA3-3AE183C0B615}" dt="2024-11-27T17:53:41.116" v="47"/>
-          <pc:sldLayoutMkLst>
-            <pc:docMk/>
-            <pc:sldMasterMk cId="0" sldId="2147483742"/>
-            <pc:sldLayoutMk cId="0" sldId="2147483743"/>
-          </pc:sldLayoutMkLst>
-        </pc:sldLayoutChg>
-      </pc:sldMasterChg>
-      <pc:sldMasterChg chg="del delSldLayout">
-        <pc:chgData name="Pedro Samuel" userId="70e97cf450802abf" providerId="Windows Live" clId="Web-{F1D889FE-CC1A-488F-BDA3-3AE183C0B615}" dt="2024-11-27T17:53:41.116" v="48"/>
-        <pc:sldMasterMkLst>
-          <pc:docMk/>
-          <pc:sldMasterMk cId="0" sldId="2147483744"/>
-        </pc:sldMasterMkLst>
-        <pc:sldLayoutChg chg="del">
-          <pc:chgData name="Pedro Samuel" userId="70e97cf450802abf" providerId="Windows Live" clId="Web-{F1D889FE-CC1A-488F-BDA3-3AE183C0B615}" dt="2024-11-27T17:53:41.116" v="48"/>
-          <pc:sldLayoutMkLst>
-            <pc:docMk/>
-            <pc:sldMasterMk cId="0" sldId="2147483744"/>
-            <pc:sldLayoutMk cId="0" sldId="2147483745"/>
-          </pc:sldLayoutMkLst>
-        </pc:sldLayoutChg>
-      </pc:sldMasterChg>
-      <pc:sldMasterChg chg="del delSldLayout">
-        <pc:chgData name="Pedro Samuel" userId="70e97cf450802abf" providerId="Windows Live" clId="Web-{F1D889FE-CC1A-488F-BDA3-3AE183C0B615}" dt="2024-11-27T17:53:41.116" v="49"/>
-        <pc:sldMasterMkLst>
-          <pc:docMk/>
-          <pc:sldMasterMk cId="0" sldId="2147483746"/>
-        </pc:sldMasterMkLst>
-        <pc:sldLayoutChg chg="del">
-          <pc:chgData name="Pedro Samuel" userId="70e97cf450802abf" providerId="Windows Live" clId="Web-{F1D889FE-CC1A-488F-BDA3-3AE183C0B615}" dt="2024-11-27T17:53:41.116" v="49"/>
-          <pc:sldLayoutMkLst>
-            <pc:docMk/>
-            <pc:sldMasterMk cId="0" sldId="2147483746"/>
-            <pc:sldLayoutMk cId="0" sldId="2147483747"/>
-          </pc:sldLayoutMkLst>
-        </pc:sldLayoutChg>
-      </pc:sldMasterChg>
-      <pc:sldMasterChg chg="del delSldLayout">
-        <pc:chgData name="Pedro Samuel" userId="70e97cf450802abf" providerId="Windows Live" clId="Web-{F1D889FE-CC1A-488F-BDA3-3AE183C0B615}" dt="2024-11-27T17:53:41.116" v="50"/>
-        <pc:sldMasterMkLst>
-          <pc:docMk/>
-          <pc:sldMasterMk cId="0" sldId="2147483748"/>
-        </pc:sldMasterMkLst>
-        <pc:sldLayoutChg chg="del">
-          <pc:chgData name="Pedro Samuel" userId="70e97cf450802abf" providerId="Windows Live" clId="Web-{F1D889FE-CC1A-488F-BDA3-3AE183C0B615}" dt="2024-11-27T17:53:41.116" v="50"/>
-          <pc:sldLayoutMkLst>
-            <pc:docMk/>
-            <pc:sldMasterMk cId="0" sldId="2147483748"/>
-            <pc:sldLayoutMk cId="0" sldId="2147483749"/>
-          </pc:sldLayoutMkLst>
-        </pc:sldLayoutChg>
-      </pc:sldMasterChg>
-      <pc:sldMasterChg chg="del delSldLayout">
-        <pc:chgData name="Pedro Samuel" userId="70e97cf450802abf" providerId="Windows Live" clId="Web-{F1D889FE-CC1A-488F-BDA3-3AE183C0B615}" dt="2024-11-27T17:53:41.116" v="51"/>
-        <pc:sldMasterMkLst>
-          <pc:docMk/>
-          <pc:sldMasterMk cId="0" sldId="2147483750"/>
-        </pc:sldMasterMkLst>
-        <pc:sldLayoutChg chg="del">
-          <pc:chgData name="Pedro Samuel" userId="70e97cf450802abf" providerId="Windows Live" clId="Web-{F1D889FE-CC1A-488F-BDA3-3AE183C0B615}" dt="2024-11-27T17:53:41.116" v="51"/>
-          <pc:sldLayoutMkLst>
-            <pc:docMk/>
-            <pc:sldMasterMk cId="0" sldId="2147483750"/>
-            <pc:sldLayoutMk cId="0" sldId="2147483751"/>
-          </pc:sldLayoutMkLst>
-        </pc:sldLayoutChg>
-      </pc:sldMasterChg>
-      <pc:sldMasterChg chg="del delSldLayout">
-        <pc:chgData name="Pedro Samuel" userId="70e97cf450802abf" providerId="Windows Live" clId="Web-{F1D889FE-CC1A-488F-BDA3-3AE183C0B615}" dt="2024-11-27T17:53:41.116" v="52"/>
-        <pc:sldMasterMkLst>
-          <pc:docMk/>
-          <pc:sldMasterMk cId="0" sldId="2147483752"/>
-        </pc:sldMasterMkLst>
-        <pc:sldLayoutChg chg="del">
-          <pc:chgData name="Pedro Samuel" userId="70e97cf450802abf" providerId="Windows Live" clId="Web-{F1D889FE-CC1A-488F-BDA3-3AE183C0B615}" dt="2024-11-27T17:53:41.116" v="52"/>
-          <pc:sldLayoutMkLst>
-            <pc:docMk/>
-            <pc:sldMasterMk cId="0" sldId="2147483752"/>
-            <pc:sldLayoutMk cId="0" sldId="2147483753"/>
-          </pc:sldLayoutMkLst>
-        </pc:sldLayoutChg>
-      </pc:sldMasterChg>
-      <pc:sldMasterChg chg="del delSldLayout">
-        <pc:chgData name="Pedro Samuel" userId="70e97cf450802abf" providerId="Windows Live" clId="Web-{F1D889FE-CC1A-488F-BDA3-3AE183C0B615}" dt="2024-11-27T17:53:41.116" v="53"/>
-        <pc:sldMasterMkLst>
-          <pc:docMk/>
-          <pc:sldMasterMk cId="0" sldId="2147483754"/>
-        </pc:sldMasterMkLst>
-        <pc:sldLayoutChg chg="del">
-          <pc:chgData name="Pedro Samuel" userId="70e97cf450802abf" providerId="Windows Live" clId="Web-{F1D889FE-CC1A-488F-BDA3-3AE183C0B615}" dt="2024-11-27T17:53:41.116" v="53"/>
-          <pc:sldLayoutMkLst>
-            <pc:docMk/>
-            <pc:sldMasterMk cId="0" sldId="2147483754"/>
-            <pc:sldLayoutMk cId="0" sldId="2147483755"/>
-          </pc:sldLayoutMkLst>
-        </pc:sldLayoutChg>
-      </pc:sldMasterChg>
-      <pc:sldMasterChg chg="del delSldLayout">
-        <pc:chgData name="Pedro Samuel" userId="70e97cf450802abf" providerId="Windows Live" clId="Web-{F1D889FE-CC1A-488F-BDA3-3AE183C0B615}" dt="2024-11-27T17:53:41.116" v="54"/>
-        <pc:sldMasterMkLst>
-          <pc:docMk/>
-          <pc:sldMasterMk cId="0" sldId="2147483756"/>
-        </pc:sldMasterMkLst>
-        <pc:sldLayoutChg chg="del">
-          <pc:chgData name="Pedro Samuel" userId="70e97cf450802abf" providerId="Windows Live" clId="Web-{F1D889FE-CC1A-488F-BDA3-3AE183C0B615}" dt="2024-11-27T17:53:41.116" v="54"/>
-          <pc:sldLayoutMkLst>
-            <pc:docMk/>
-            <pc:sldMasterMk cId="0" sldId="2147483756"/>
-            <pc:sldLayoutMk cId="0" sldId="2147483757"/>
-          </pc:sldLayoutMkLst>
-        </pc:sldLayoutChg>
-      </pc:sldMasterChg>
-      <pc:sldMasterChg chg="del delSldLayout">
-        <pc:chgData name="Pedro Samuel" userId="70e97cf450802abf" providerId="Windows Live" clId="Web-{F1D889FE-CC1A-488F-BDA3-3AE183C0B615}" dt="2024-11-27T17:53:41.116" v="55"/>
-        <pc:sldMasterMkLst>
-          <pc:docMk/>
-          <pc:sldMasterMk cId="0" sldId="2147483758"/>
-        </pc:sldMasterMkLst>
-        <pc:sldLayoutChg chg="del">
-          <pc:chgData name="Pedro Samuel" userId="70e97cf450802abf" providerId="Windows Live" clId="Web-{F1D889FE-CC1A-488F-BDA3-3AE183C0B615}" dt="2024-11-27T17:53:41.116" v="55"/>
-          <pc:sldLayoutMkLst>
-            <pc:docMk/>
-            <pc:sldMasterMk cId="0" sldId="2147483758"/>
-            <pc:sldLayoutMk cId="0" sldId="2147483759"/>
-          </pc:sldLayoutMkLst>
-        </pc:sldLayoutChg>
-      </pc:sldMasterChg>
-      <pc:sldMasterChg chg="del delSldLayout">
-        <pc:chgData name="Pedro Samuel" userId="70e97cf450802abf" providerId="Windows Live" clId="Web-{F1D889FE-CC1A-488F-BDA3-3AE183C0B615}" dt="2024-11-27T17:53:41.116" v="56"/>
-        <pc:sldMasterMkLst>
-          <pc:docMk/>
-          <pc:sldMasterMk cId="0" sldId="2147483760"/>
-        </pc:sldMasterMkLst>
-        <pc:sldLayoutChg chg="del">
-          <pc:chgData name="Pedro Samuel" userId="70e97cf450802abf" providerId="Windows Live" clId="Web-{F1D889FE-CC1A-488F-BDA3-3AE183C0B615}" dt="2024-11-27T17:53:41.116" v="56"/>
-          <pc:sldLayoutMkLst>
-            <pc:docMk/>
-            <pc:sldMasterMk cId="0" sldId="2147483760"/>
-            <pc:sldLayoutMk cId="0" sldId="2147483761"/>
-          </pc:sldLayoutMkLst>
-        </pc:sldLayoutChg>
-      </pc:sldMasterChg>
-      <pc:sldMasterChg chg="del delSldLayout">
-        <pc:chgData name="Pedro Samuel" userId="70e97cf450802abf" providerId="Windows Live" clId="Web-{F1D889FE-CC1A-488F-BDA3-3AE183C0B615}" dt="2024-11-27T17:53:41.116" v="57"/>
-        <pc:sldMasterMkLst>
-          <pc:docMk/>
-          <pc:sldMasterMk cId="0" sldId="2147483762"/>
-        </pc:sldMasterMkLst>
-        <pc:sldLayoutChg chg="del">
-          <pc:chgData name="Pedro Samuel" userId="70e97cf450802abf" providerId="Windows Live" clId="Web-{F1D889FE-CC1A-488F-BDA3-3AE183C0B615}" dt="2024-11-27T17:53:41.116" v="57"/>
-          <pc:sldLayoutMkLst>
-            <pc:docMk/>
-            <pc:sldMasterMk cId="0" sldId="2147483762"/>
-            <pc:sldLayoutMk cId="0" sldId="2147483763"/>
-          </pc:sldLayoutMkLst>
-        </pc:sldLayoutChg>
-      </pc:sldMasterChg>
-      <pc:sldMasterChg chg="del delSldLayout">
-        <pc:chgData name="Pedro Samuel" userId="70e97cf450802abf" providerId="Windows Live" clId="Web-{F1D889FE-CC1A-488F-BDA3-3AE183C0B615}" dt="2024-11-27T17:53:41.116" v="58"/>
-        <pc:sldMasterMkLst>
-          <pc:docMk/>
-          <pc:sldMasterMk cId="0" sldId="2147483764"/>
-        </pc:sldMasterMkLst>
-        <pc:sldLayoutChg chg="del">
-          <pc:chgData name="Pedro Samuel" userId="70e97cf450802abf" providerId="Windows Live" clId="Web-{F1D889FE-CC1A-488F-BDA3-3AE183C0B615}" dt="2024-11-27T17:53:41.116" v="58"/>
-          <pc:sldLayoutMkLst>
-            <pc:docMk/>
-            <pc:sldMasterMk cId="0" sldId="2147483764"/>
-            <pc:sldLayoutMk cId="0" sldId="2147483765"/>
-          </pc:sldLayoutMkLst>
-        </pc:sldLayoutChg>
-      </pc:sldMasterChg>
-      <pc:sldMasterChg chg="del delSldLayout">
-        <pc:chgData name="Pedro Samuel" userId="70e97cf450802abf" providerId="Windows Live" clId="Web-{F1D889FE-CC1A-488F-BDA3-3AE183C0B615}" dt="2024-11-27T17:53:41.116" v="59"/>
-        <pc:sldMasterMkLst>
-          <pc:docMk/>
-          <pc:sldMasterMk cId="0" sldId="2147483766"/>
-        </pc:sldMasterMkLst>
-        <pc:sldLayoutChg chg="del">
-          <pc:chgData name="Pedro Samuel" userId="70e97cf450802abf" providerId="Windows Live" clId="Web-{F1D889FE-CC1A-488F-BDA3-3AE183C0B615}" dt="2024-11-27T17:53:41.116" v="59"/>
-          <pc:sldLayoutMkLst>
-            <pc:docMk/>
-            <pc:sldMasterMk cId="0" sldId="2147483766"/>
-            <pc:sldLayoutMk cId="0" sldId="2147483767"/>
-          </pc:sldLayoutMkLst>
-        </pc:sldLayoutChg>
-      </pc:sldMasterChg>
-    </pc:docChg>
-  </pc:docChgLst>
-  <pc:docChgLst>
-    <pc:chgData name="Pedro Samuel" userId="70e97cf450802abf" providerId="Windows Live" clId="Web-{1E735FCB-970C-4D14-B4B3-E5D05BF44C66}"/>
-    <pc:docChg chg="modSld">
-      <pc:chgData name="Pedro Samuel" userId="70e97cf450802abf" providerId="Windows Live" clId="Web-{1E735FCB-970C-4D14-B4B3-E5D05BF44C66}" dt="2024-11-27T18:21:39.827" v="22" actId="1076"/>
-      <pc:docMkLst>
-        <pc:docMk/>
-      </pc:docMkLst>
-      <pc:sldChg chg="modSp">
-        <pc:chgData name="Pedro Samuel" userId="70e97cf450802abf" providerId="Windows Live" clId="Web-{1E735FCB-970C-4D14-B4B3-E5D05BF44C66}" dt="2024-11-27T18:21:39.827" v="22" actId="1076"/>
-        <pc:sldMkLst>
-          <pc:docMk/>
-          <pc:sldMk cId="0" sldId="257"/>
-        </pc:sldMkLst>
-        <pc:spChg chg="mod">
-          <ac:chgData name="Pedro Samuel" userId="70e97cf450802abf" providerId="Windows Live" clId="Web-{1E735FCB-970C-4D14-B4B3-E5D05BF44C66}" dt="2024-11-27T18:20:30.138" v="13" actId="1076"/>
-          <ac:spMkLst>
-            <pc:docMk/>
-            <pc:sldMk cId="0" sldId="257"/>
-            <ac:spMk id="407" creationId="{00000000-0000-0000-0000-000000000000}"/>
-          </ac:spMkLst>
-        </pc:spChg>
-        <pc:spChg chg="mod">
-          <ac:chgData name="Pedro Samuel" userId="70e97cf450802abf" providerId="Windows Live" clId="Web-{1E735FCB-970C-4D14-B4B3-E5D05BF44C66}" dt="2024-11-27T18:21:39.827" v="22" actId="1076"/>
-          <ac:spMkLst>
-            <pc:docMk/>
-            <pc:sldMk cId="0" sldId="257"/>
-            <ac:spMk id="408" creationId="{00000000-0000-0000-0000-000000000000}"/>
-          </ac:spMkLst>
-        </pc:spChg>
-        <pc:spChg chg="mod">
-          <ac:chgData name="Pedro Samuel" userId="70e97cf450802abf" providerId="Windows Live" clId="Web-{1E735FCB-970C-4D14-B4B3-E5D05BF44C66}" dt="2024-11-27T18:21:31.937" v="20" actId="1076"/>
-          <ac:spMkLst>
-            <pc:docMk/>
-            <pc:sldMk cId="0" sldId="257"/>
-            <ac:spMk id="409" creationId="{00000000-0000-0000-0000-000000000000}"/>
-          </ac:spMkLst>
-        </pc:spChg>
-        <pc:spChg chg="mod">
-          <ac:chgData name="Pedro Samuel" userId="70e97cf450802abf" providerId="Windows Live" clId="Web-{1E735FCB-970C-4D14-B4B3-E5D05BF44C66}" dt="2024-11-27T18:19:37.698" v="4" actId="20577"/>
-          <ac:spMkLst>
-            <pc:docMk/>
-            <pc:sldMk cId="0" sldId="257"/>
-            <ac:spMk id="410" creationId="{00000000-0000-0000-0000-000000000000}"/>
-          </ac:spMkLst>
-        </pc:spChg>
-        <pc:spChg chg="mod">
-          <ac:chgData name="Pedro Samuel" userId="70e97cf450802abf" providerId="Windows Live" clId="Web-{1E735FCB-970C-4D14-B4B3-E5D05BF44C66}" dt="2024-11-27T18:19:44.011" v="7" actId="20577"/>
-          <ac:spMkLst>
-            <pc:docMk/>
-            <pc:sldMk cId="0" sldId="257"/>
-            <ac:spMk id="412" creationId="{00000000-0000-0000-0000-000000000000}"/>
-          </ac:spMkLst>
-        </pc:spChg>
-        <pc:graphicFrameChg chg="modGraphic">
-          <ac:chgData name="Pedro Samuel" userId="70e97cf450802abf" providerId="Windows Live" clId="Web-{1E735FCB-970C-4D14-B4B3-E5D05BF44C66}" dt="2024-11-27T18:20:33.185" v="14"/>
-          <ac:graphicFrameMkLst>
-            <pc:docMk/>
-            <pc:sldMk cId="0" sldId="257"/>
-            <ac:graphicFrameMk id="411" creationId="{00000000-0000-0000-0000-000000000000}"/>
-          </ac:graphicFrameMkLst>
-        </pc:graphicFrameChg>
-      </pc:sldChg>
-    </pc:docChg>
-  </pc:docChgLst>
-</pc:chgInfo>
 </file>
 
 <file path=ppt/slideLayouts/slideLayout1.xml><?xml version="1.0" encoding="utf-8"?>
@@ -4721,27 +3750,67 @@
               </a:lnSpc>
             </a:pPr>
             <a:r>
-              <a:rPr lang="pt-BR" sz="1000" b="0" u="none" strike="noStrike">
-                <a:solidFill>
-                  <a:srgbClr val="000000"/>
-                </a:solidFill>
-                <a:uFillTx/>
-                <a:latin typeface="Arial"/>
-              </a:rPr>
-              <a:t>funcionário(a), portador(a) do CPF: [cpf], concluiu o treinamento de capacitação profissional, conforme a </a:t>
-            </a:r>
-            <a:r>
-              <a:rPr lang="pt-BR" sz="1000" b="1" u="none" strike="noStrike">
-                <a:solidFill>
-                  <a:srgbClr val="000000"/>
-                </a:solidFill>
-                <a:uFillTx/>
-                <a:latin typeface="Arial"/>
-              </a:rPr>
-              <a:t>[nome_treinamento]</a:t>
-            </a:r>
-            <a:r>
-              <a:rPr lang="pt-BR" sz="1000" b="0" u="none" strike="noStrike">
+              <a:rPr lang="pt-BR" sz="1000" b="0" u="none" strike="noStrike" dirty="0">
+                <a:solidFill>
+                  <a:srgbClr val="000000"/>
+                </a:solidFill>
+                <a:uFillTx/>
+                <a:latin typeface="Arial"/>
+              </a:rPr>
+              <a:t>funcionário(a), portador(a) do CPF: [</a:t>
+            </a:r>
+            <a:r>
+              <a:rPr lang="pt-BR" sz="1000" b="0" u="none" strike="noStrike" dirty="0" err="1">
+                <a:solidFill>
+                  <a:srgbClr val="000000"/>
+                </a:solidFill>
+                <a:uFillTx/>
+                <a:latin typeface="Arial"/>
+              </a:rPr>
+              <a:t>cpf</a:t>
+            </a:r>
+            <a:r>
+              <a:rPr lang="pt-BR" sz="1000" b="0" u="none" strike="noStrike" dirty="0">
+                <a:solidFill>
+                  <a:srgbClr val="000000"/>
+                </a:solidFill>
+                <a:uFillTx/>
+                <a:latin typeface="Arial"/>
+              </a:rPr>
+              <a:t>], concluiu o treinamento de capacitação profissional, conforme a </a:t>
+            </a:r>
+            <a:r>
+              <a:rPr lang="pt-BR" sz="1000" b="1" u="none" strike="noStrike" dirty="0">
+                <a:solidFill>
+                  <a:srgbClr val="000000"/>
+                </a:solidFill>
+                <a:uFillTx/>
+                <a:latin typeface="Arial"/>
+              </a:rPr>
+              <a:t>[</a:t>
+            </a:r>
+            <a:r>
+              <a:rPr lang="pt-BR" sz="1000" b="1" u="none" strike="noStrike" dirty="0" err="1">
+                <a:solidFill>
+                  <a:srgbClr val="000000"/>
+                </a:solidFill>
+                <a:uFillTx/>
+                <a:latin typeface="Arial"/>
+              </a:rPr>
+              <a:t>nome_treinamento</a:t>
+            </a:r>
+            <a:r>
+              <a:rPr lang="pt-BR" sz="1000" b="1" u="none" strike="noStrike" dirty="0">
+                <a:solidFill>
+                  <a:srgbClr val="000000"/>
+                </a:solidFill>
+                <a:uFillTx/>
+                <a:latin typeface="Arial"/>
+              </a:rPr>
+              <a:t>]</a:t>
+            </a:r>
+            <a:r>
+              <a:rPr lang="pt-BR" sz="1000" b="0" u="none" strike="noStrike" dirty="0">
                 <a:solidFill>
                   <a:srgbClr val="000000"/>
                 </a:solidFill>
@@ -4751,26 +3820,161 @@
               <a:t>, regulamentada pela </a:t>
             </a:r>
             <a:r>
-              <a:rPr lang="pt-BR" sz="1000" b="1" u="none" strike="noStrike">
-                <a:solidFill>
-                  <a:srgbClr val="000000"/>
-                </a:solidFill>
-                <a:uFillTx/>
-                <a:latin typeface="Arial"/>
-              </a:rPr>
-              <a:t>[portaria_treinamento]</a:t>
-            </a:r>
-            <a:r>
-              <a:rPr lang="pt-BR" sz="1000" b="0" u="none" strike="noStrike">
-                <a:solidFill>
-                  <a:srgbClr val="000000"/>
-                </a:solidFill>
-                <a:uFillTx/>
-                <a:latin typeface="Arial"/>
-              </a:rPr>
-              <a:t>. Este treinamento foi patrocinado pela empresa [empresa], inscrita no CNPJ: [cnpj], e realizado no dia [r_dia] de [r_mes] de 2024, das [r_hora] às [r_minutos], totalizando uma carga horária de [carga_hora] horas/aula. O(a) participante foi avaliado(a) e considerado(a) apto(a) pelo instrutor e responsável técnica da capacitação.</a:t>
-            </a:r>
-            <a:endParaRPr lang="en-US" sz="1000" b="0" u="none" strike="noStrike">
+              <a:rPr lang="pt-BR" sz="1000" b="1" u="none" strike="noStrike" dirty="0">
+                <a:solidFill>
+                  <a:srgbClr val="000000"/>
+                </a:solidFill>
+                <a:uFillTx/>
+                <a:latin typeface="Arial"/>
+              </a:rPr>
+              <a:t>[</a:t>
+            </a:r>
+            <a:r>
+              <a:rPr lang="pt-BR" sz="1000" b="1" u="none" strike="noStrike" dirty="0" err="1">
+                <a:solidFill>
+                  <a:srgbClr val="000000"/>
+                </a:solidFill>
+                <a:uFillTx/>
+                <a:latin typeface="Arial"/>
+              </a:rPr>
+              <a:t>portaria_treinamento</a:t>
+            </a:r>
+            <a:r>
+              <a:rPr lang="pt-BR" sz="1000" b="1" u="none" strike="noStrike" dirty="0">
+                <a:solidFill>
+                  <a:srgbClr val="000000"/>
+                </a:solidFill>
+                <a:uFillTx/>
+                <a:latin typeface="Arial"/>
+              </a:rPr>
+              <a:t>]</a:t>
+            </a:r>
+            <a:r>
+              <a:rPr lang="pt-BR" sz="1000" b="0" u="none" strike="noStrike" dirty="0">
+                <a:solidFill>
+                  <a:srgbClr val="000000"/>
+                </a:solidFill>
+                <a:uFillTx/>
+                <a:latin typeface="Arial"/>
+              </a:rPr>
+              <a:t>. Este treinamento foi patrocinado pela empresa [empresa], inscrita no CNPJ: [</a:t>
+            </a:r>
+            <a:r>
+              <a:rPr lang="pt-BR" sz="1000" b="0" u="none" strike="noStrike" dirty="0" err="1">
+                <a:solidFill>
+                  <a:srgbClr val="000000"/>
+                </a:solidFill>
+                <a:uFillTx/>
+                <a:latin typeface="Arial"/>
+              </a:rPr>
+              <a:t>cnpj</a:t>
+            </a:r>
+            <a:r>
+              <a:rPr lang="pt-BR" sz="1000" b="0" u="none" strike="noStrike" dirty="0">
+                <a:solidFill>
+                  <a:srgbClr val="000000"/>
+                </a:solidFill>
+                <a:uFillTx/>
+                <a:latin typeface="Arial"/>
+              </a:rPr>
+              <a:t>], e realizado no dia </a:t>
+            </a:r>
+            <a:r>
+              <a:rPr lang="pt-BR" sz="1000" dirty="0">
+                <a:solidFill>
+                  <a:srgbClr val="000000"/>
+                </a:solidFill>
+                <a:latin typeface="Arial"/>
+              </a:rPr>
+              <a:t>[</a:t>
+            </a:r>
+            <a:r>
+              <a:rPr lang="pt-BR" sz="1000" dirty="0" err="1">
+                <a:solidFill>
+                  <a:srgbClr val="000000"/>
+                </a:solidFill>
+                <a:latin typeface="Arial"/>
+              </a:rPr>
+              <a:t>data_realizada</a:t>
+            </a:r>
+            <a:r>
+              <a:rPr lang="pt-BR" sz="1000" dirty="0">
+                <a:solidFill>
+                  <a:srgbClr val="000000"/>
+                </a:solidFill>
+                <a:latin typeface="Arial"/>
+              </a:rPr>
+              <a:t>],</a:t>
+            </a:r>
+            <a:r>
+              <a:rPr lang="pt-BR" sz="1000" b="0" u="none" strike="noStrike" dirty="0">
+                <a:solidFill>
+                  <a:srgbClr val="000000"/>
+                </a:solidFill>
+                <a:uFillTx/>
+                <a:latin typeface="Arial"/>
+              </a:rPr>
+              <a:t> das [r_hora</a:t>
+            </a:r>
+            <a:r>
+              <a:rPr lang="pt-BR" sz="1000" dirty="0">
+                <a:solidFill>
+                  <a:srgbClr val="000000"/>
+                </a:solidFill>
+                <a:latin typeface="Arial"/>
+              </a:rPr>
+              <a:t>_1]</a:t>
+            </a:r>
+            <a:r>
+              <a:rPr lang="pt-BR" sz="1000" b="0" u="none" strike="noStrike" dirty="0">
+                <a:solidFill>
+                  <a:srgbClr val="000000"/>
+                </a:solidFill>
+                <a:uFillTx/>
+                <a:latin typeface="Arial"/>
+              </a:rPr>
+              <a:t> às [r_</a:t>
+            </a:r>
+            <a:r>
+              <a:rPr lang="pt-BR" sz="1000" dirty="0">
+                <a:solidFill>
+                  <a:srgbClr val="000000"/>
+                </a:solidFill>
+                <a:latin typeface="Arial"/>
+              </a:rPr>
+              <a:t>horas_2],</a:t>
+            </a:r>
+            <a:r>
+              <a:rPr lang="pt-BR" sz="1000" b="0" u="none" strike="noStrike" dirty="0">
+                <a:solidFill>
+                  <a:srgbClr val="000000"/>
+                </a:solidFill>
+                <a:uFillTx/>
+                <a:latin typeface="Arial"/>
+              </a:rPr>
+              <a:t> totalizando uma carga horária de [</a:t>
+            </a:r>
+            <a:r>
+              <a:rPr lang="pt-BR" sz="1000" b="0" u="none" strike="noStrike" dirty="0" err="1">
+                <a:solidFill>
+                  <a:srgbClr val="000000"/>
+                </a:solidFill>
+                <a:uFillTx/>
+                <a:latin typeface="Arial"/>
+              </a:rPr>
+              <a:t>carga_hora</a:t>
+            </a:r>
+            <a:r>
+              <a:rPr lang="pt-BR" sz="1000" b="0" u="none" strike="noStrike" dirty="0">
+                <a:solidFill>
+                  <a:srgbClr val="000000"/>
+                </a:solidFill>
+                <a:uFillTx/>
+                <a:latin typeface="Arial"/>
+              </a:rPr>
+              <a:t>] horas/aula. O(a) participante foi avaliado(a) e considerado(a) apto(a) pelo instrutor e responsável técnica da capacitação.</a:t>
+            </a:r>
+            <a:endParaRPr lang="en-US" sz="1000" b="0" u="none" strike="noStrike" dirty="0">
               <a:solidFill>
                 <a:srgbClr val="000000"/>
               </a:solidFill>
@@ -4799,28 +4003,113 @@
               </a:lnSpc>
             </a:pPr>
             <a:r>
-              <a:rPr lang="pt-BR" sz="1050" b="1" u="none" strike="noStrike">
-                <a:solidFill>
-                  <a:srgbClr val="000000"/>
-                </a:solidFill>
-                <a:uFillTx/>
-                <a:latin typeface="Arial"/>
-              </a:rPr>
-              <a:t>EMISSÃO DO CERTIFICADO DIA [e_dia] DE [e_mes] DE 2024 – TRÊS LAGOAS/ MS</a:t>
-            </a:r>
-            <a:r>
-              <a:rPr lang="pt-BR" sz="1050" b="1" u="none" strike="noStrike">
+              <a:rPr lang="pt-BR" sz="1050" b="1" u="none" strike="noStrike" dirty="0">
+                <a:solidFill>
+                  <a:srgbClr val="000000"/>
+                </a:solidFill>
+                <a:uFillTx/>
+                <a:latin typeface="Arial"/>
+              </a:rPr>
+              <a:t>EMISSÃO DO CERTIFICADO DIA [</a:t>
+            </a:r>
+            <a:r>
+              <a:rPr lang="pt-BR" sz="1050" b="1" u="none" strike="noStrike" dirty="0" err="1">
+                <a:solidFill>
+                  <a:srgbClr val="000000"/>
+                </a:solidFill>
+                <a:uFillTx/>
+                <a:latin typeface="Arial"/>
+              </a:rPr>
+              <a:t>e_dia</a:t>
+            </a:r>
+            <a:r>
+              <a:rPr lang="pt-BR" sz="1050" b="1" u="none" strike="noStrike" dirty="0">
+                <a:solidFill>
+                  <a:srgbClr val="000000"/>
+                </a:solidFill>
+                <a:uFillTx/>
+                <a:latin typeface="Arial"/>
+              </a:rPr>
+              <a:t>] </a:t>
+            </a:r>
+            <a:r>
+              <a:rPr lang="pt-BR" sz="1050" b="1" dirty="0">
+                <a:solidFill>
+                  <a:srgbClr val="000000"/>
+                </a:solidFill>
+                <a:latin typeface="Arial"/>
+              </a:rPr>
+              <a:t>DO</a:t>
+            </a:r>
+            <a:r>
+              <a:rPr lang="pt-BR" sz="1050" b="1" u="none" strike="noStrike" dirty="0">
+                <a:solidFill>
+                  <a:srgbClr val="000000"/>
+                </a:solidFill>
+                <a:uFillTx/>
+                <a:latin typeface="Arial"/>
+              </a:rPr>
+              <a:t> [</a:t>
+            </a:r>
+            <a:r>
+              <a:rPr lang="pt-BR" sz="1050" b="1" u="none" strike="noStrike" dirty="0" err="1">
+                <a:solidFill>
+                  <a:srgbClr val="000000"/>
+                </a:solidFill>
+                <a:uFillTx/>
+                <a:latin typeface="Arial"/>
+              </a:rPr>
+              <a:t>e_mes</a:t>
+            </a:r>
+            <a:r>
+              <a:rPr lang="pt-BR" sz="1050" b="1" u="none" strike="noStrike" dirty="0">
+                <a:solidFill>
+                  <a:srgbClr val="000000"/>
+                </a:solidFill>
+                <a:uFillTx/>
+                <a:latin typeface="Arial"/>
+              </a:rPr>
+              <a:t>] DE 2024 – </a:t>
+            </a:r>
+            <a:r>
+              <a:rPr lang="pt-BR" sz="1050" b="1" dirty="0">
+                <a:solidFill>
+                  <a:srgbClr val="000000"/>
+                </a:solidFill>
+                <a:latin typeface="Arial"/>
+              </a:rPr>
+              <a:t>[</a:t>
+            </a:r>
+            <a:r>
+              <a:rPr lang="pt-BR" sz="1050" b="1" dirty="0" err="1">
+                <a:solidFill>
+                  <a:srgbClr val="000000"/>
+                </a:solidFill>
+                <a:latin typeface="Arial"/>
+              </a:rPr>
+              <a:t>local</a:t>
+            </a:r>
+            <a:r>
+              <a:rPr lang="pt-BR" sz="1050" b="1" dirty="0" err="1">
                 <a:solidFill>
                   <a:schemeClr val="dk1"/>
                 </a:solidFill>
-                <a:uFillTx/>
-                <a:latin typeface="Arial"/>
-              </a:rPr>
-              <a:t>.</a:t>
-            </a:r>
-            <a:endParaRPr lang="en-US" sz="1050" b="0" u="none" strike="noStrike">
+                <a:latin typeface="Arial"/>
+              </a:rPr>
+              <a:t>_emissao</a:t>
+            </a:r>
+            <a:r>
+              <a:rPr lang="pt-BR" sz="1050" b="1" dirty="0">
+                <a:solidFill>
+                  <a:schemeClr val="dk1"/>
+                </a:solidFill>
+                <a:latin typeface="Arial"/>
+              </a:rPr>
+              <a:t>].</a:t>
+            </a:r>
+            <a:endParaRPr lang="en-US" sz="1050" b="0" u="none" strike="noStrike" dirty="0">
               <a:solidFill>
-                <a:srgbClr val="000000"/>
+                <a:schemeClr val="dk1"/>
               </a:solidFill>
               <a:uFillTx/>
               <a:latin typeface="Arial"/>
@@ -5805,7 +5094,7 @@
           <p:nvPr>
             <p:extLst>
               <p:ext uri="{D42A27DB-BD31-4B8C-83A1-F6EECF244321}">
-                <p14:modId xmlns:p14="http://schemas.microsoft.com/office/powerpoint/2010/main" val="3002520329"/>
+                <p14:modId xmlns:p14="http://schemas.microsoft.com/office/powerpoint/2010/main" val="2529654253"/>
               </p:ext>
             </p:extLst>
           </p:nvPr>
@@ -5833,32 +5122,72 @@
                     <a:bodyPr/>
                     <a:lstStyle/>
                     <a:p>
-                      <a:pPr defTabSz="914400">
+                      <a:pPr>
                         <a:lnSpc>
                           <a:spcPct val="100000"/>
                         </a:lnSpc>
                       </a:pPr>
                       <a:r>
-                        <a:rPr lang="pt-BR" sz="900" b="1" u="none" strike="noStrike">
+                        <a:rPr lang="pt-BR" sz="900" b="1" u="none" strike="noStrike" dirty="0">
                           <a:solidFill>
                             <a:schemeClr val="dk1"/>
                           </a:solidFill>
                           <a:uFillTx/>
                           <a:latin typeface="Arial"/>
                         </a:rPr>
-                        <a:t>METODOLOGIA DE ENSINO PRESENCIAL - TEÓRICO E PRÁTICO – [tipo_fo</a:t>
+                        <a:t>METODOLOGIA DE ENSINO PRESENCIAL - TEÓRICO E PRÁTICO – [</a:t>
                       </a:r>
                       <a:r>
-                        <a:rPr lang="pt-BR" sz="900" b="1" u="none" strike="noStrike">
+                        <a:rPr lang="pt-BR" sz="900" b="1" u="none" strike="noStrike" dirty="0" err="1">
+                          <a:solidFill>
+                            <a:schemeClr val="dk1"/>
+                          </a:solidFill>
+                          <a:uFillTx/>
+                          <a:latin typeface="Arial"/>
+                        </a:rPr>
+                        <a:t>tipo_fo</a:t>
+                      </a:r>
+                      <a:r>
+                        <a:rPr lang="pt-BR" sz="900" b="1" u="none" strike="noStrike" dirty="0" err="1">
                           <a:solidFill>
                             <a:srgbClr val="000000"/>
                           </a:solidFill>
                           <a:uFillTx/>
                           <a:latin typeface="Arial"/>
                         </a:rPr>
-                        <a:t>rmacao] - [carga_h]</a:t>
+                        <a:t>rmacao</a:t>
                       </a:r>
-                      <a:endParaRPr lang="en-US" sz="900" b="0" u="none" strike="noStrike">
+                      <a:r>
+                        <a:rPr lang="pt-BR" sz="900" b="1" u="none" strike="noStrike" dirty="0">
+                          <a:solidFill>
+                            <a:srgbClr val="000000"/>
+                          </a:solidFill>
+                          <a:uFillTx/>
+                          <a:latin typeface="Arial"/>
+                        </a:rPr>
+                        <a:t>] - [</a:t>
+                      </a:r>
+                      <a:r>
+                        <a:rPr lang="pt-BR" sz="1000" b="0" i="0" u="none" strike="noStrike" noProof="0" dirty="0" err="1">
+                          <a:solidFill>
+                            <a:srgbClr val="000000"/>
+                          </a:solidFill>
+                          <a:uFillTx/>
+                          <a:latin typeface="Arial"/>
+                        </a:rPr>
+                        <a:t>carga_hora</a:t>
+                      </a:r>
+                      <a:r>
+                        <a:rPr lang="pt-BR" sz="900" b="1" u="none" strike="noStrike" dirty="0">
+                          <a:solidFill>
+                            <a:srgbClr val="000000"/>
+                          </a:solidFill>
+                          <a:uFillTx/>
+                          <a:latin typeface="Arial"/>
+                        </a:rPr>
+                        <a:t>] horas/aulas</a:t>
+                      </a:r>
+                      <a:endParaRPr lang="en-US" sz="900" b="0" u="none" strike="noStrike" dirty="0">
                         <a:solidFill>
                           <a:srgbClr val="000000"/>
                         </a:solidFill>
@@ -5913,16 +5242,36 @@
                         </a:lnSpc>
                       </a:pPr>
                       <a:r>
-                        <a:rPr lang="pt-BR" sz="1200" b="0" u="none" strike="noStrike">
+                        <a:rPr lang="pt-BR" sz="1200" b="0" u="none" strike="noStrike" dirty="0">
                           <a:solidFill>
                             <a:srgbClr val="000000"/>
                           </a:solidFill>
                           <a:uFillTx/>
                           <a:latin typeface="Arial"/>
                         </a:rPr>
-                        <a:t>[descricao]</a:t>
+                        <a:t>[</a:t>
                       </a:r>
-                      <a:endParaRPr lang="en-US" sz="1200" b="0" u="none" strike="noStrike">
+                      <a:r>
+                        <a:rPr lang="pt-BR" sz="1200" b="0" u="none" strike="noStrike" dirty="0" err="1">
+                          <a:solidFill>
+                            <a:srgbClr val="000000"/>
+                          </a:solidFill>
+                          <a:uFillTx/>
+                          <a:latin typeface="Arial"/>
+                        </a:rPr>
+                        <a:t>descricao</a:t>
+                      </a:r>
+                      <a:r>
+                        <a:rPr lang="pt-BR" sz="1200" b="0" u="none" strike="noStrike" dirty="0">
+                          <a:solidFill>
+                            <a:srgbClr val="000000"/>
+                          </a:solidFill>
+                          <a:uFillTx/>
+                          <a:latin typeface="Arial"/>
+                        </a:rPr>
+                        <a:t>]</a:t>
+                      </a:r>
+                      <a:endParaRPr lang="en-US" sz="1200" b="0" u="none" strike="noStrike" dirty="0">
                         <a:solidFill>
                           <a:srgbClr val="000000"/>
                         </a:solidFill>

</xml_diff>

<commit_message>
feat: enhance Identificador and Treinamento interfaces, update Eventos and Identificadores components for improved data handling and user experience
</commit_message>
<xml_diff>
--- a/public/templates/frente-verso-2a.pptx
+++ b/public/templates/frente-verso-2a.pptx
@@ -113,8 +113,8 @@
 <file path=ppt/revisionInfo.xml><?xml version="1.0" encoding="utf-8"?>
 <p1510:revInfo xmlns:a="http://schemas.openxmlformats.org/drawingml/2006/main" xmlns:r="http://schemas.openxmlformats.org/officeDocument/2006/relationships" xmlns:p1510="http://schemas.microsoft.com/office/powerpoint/2015/10/main">
   <p1510:revLst>
-    <p1510:client id="{EA9CA41D-5676-4B16-B365-FD2B3B4CFE7B}" v="63" dt="2024-12-18T14:45:07.264"/>
-    <p1510:client id="{ECA3990B-D76C-4346-B91E-69C766162F4E}" v="48" dt="2024-12-18T14:07:42.439"/>
+    <p1510:client id="{23E2F1ED-B1E5-4AE6-A728-F30967A2B5D1}" v="34" dt="2025-01-05T20:20:39.285"/>
+    <p1510:client id="{7F77D108-246B-40A1-8CB4-174B7842DCA7}" v="206" dt="2025-01-03T23:52:52.406"/>
   </p1510:revLst>
 </p1510:revInfo>
 </file>
@@ -3933,19 +3933,29 @@
                 <a:uFillTx/>
                 <a:latin typeface="Arial"/>
               </a:rPr>
-              <a:t> às [r_</a:t>
-            </a:r>
-            <a:r>
-              <a:rPr lang="pt-BR" sz="1000" dirty="0">
-                <a:solidFill>
-                  <a:srgbClr val="000000"/>
-                </a:solidFill>
-                <a:latin typeface="Arial"/>
-              </a:rPr>
-              <a:t>horas_2],</a:t>
-            </a:r>
-            <a:r>
-              <a:rPr lang="pt-BR" sz="1000" b="0" u="none" strike="noStrike" dirty="0">
+              <a:t> às </a:t>
+            </a:r>
+            <a:r>
+              <a:rPr lang="pt-BR" sz="1000" b="0" u="none" strike="noStrike">
+                <a:solidFill>
+                  <a:srgbClr val="000000"/>
+                </a:solidFill>
+                <a:uFillTx/>
+                <a:latin typeface="Arial"/>
+              </a:rPr>
+              <a:t>[r_</a:t>
+            </a:r>
+            <a:r>
+              <a:rPr lang="pt-BR" sz="1000">
+                <a:solidFill>
+                  <a:srgbClr val="000000"/>
+                </a:solidFill>
+                <a:latin typeface="Arial"/>
+              </a:rPr>
+              <a:t>hora_2],</a:t>
+            </a:r>
+            <a:r>
+              <a:rPr lang="pt-BR" sz="1000" b="0" u="none" strike="noStrike">
                 <a:solidFill>
                   <a:srgbClr val="000000"/>
                 </a:solidFill>
@@ -4557,23 +4567,15 @@
               </a:lnSpc>
             </a:pPr>
             <a:r>
-              <a:rPr lang="pt-BR" sz="2400" b="1" u="none" strike="noStrike" dirty="0">
-                <a:solidFill>
-                  <a:srgbClr val="000000"/>
-                </a:solidFill>
-                <a:uFillTx/>
+              <a:rPr lang="pt-BR" sz="2400" b="1">
+                <a:solidFill>
+                  <a:srgbClr val="000000"/>
+                </a:solidFill>
                 <a:latin typeface="Calibri"/>
-                <a:ea typeface="Times New Roman"/>
-              </a:rPr>
-              <a:t>CIPA</a:t>
-            </a:r>
-            <a:endParaRPr lang="en-US" sz="2400" b="0" u="none" strike="noStrike" dirty="0">
-              <a:solidFill>
-                <a:srgbClr val="000000"/>
-              </a:solidFill>
-              <a:uFillTx/>
-              <a:latin typeface="Arial"/>
-            </a:endParaRPr>
+              </a:rPr>
+              <a:t>[titulo_treinamento]</a:t>
+            </a:r>
+            <a:endParaRPr lang="pt-BR"/>
           </a:p>
           <a:p>
             <a:pPr algn="ctr" defTabSz="914400">
@@ -4582,7 +4584,7 @@
               </a:lnSpc>
             </a:pPr>
             <a:r>
-              <a:rPr lang="pt-BR" sz="1200" b="1" u="none" strike="noStrike" dirty="0">
+              <a:rPr lang="pt-BR" sz="1200" b="1" u="none" strike="noStrike">
                 <a:solidFill>
                   <a:srgbClr val="000000"/>
                 </a:solidFill>
@@ -4593,15 +4595,25 @@
               <a:t>[</a:t>
             </a:r>
             <a:r>
-              <a:rPr lang="pt-BR" sz="1200" b="1" u="none" strike="noStrike" err="1">
-                <a:solidFill>
-                  <a:srgbClr val="000000"/>
-                </a:solidFill>
-                <a:uFillTx/>
+              <a:rPr lang="pt-BR" sz="1200" b="1">
+                <a:solidFill>
+                  <a:srgbClr val="000000"/>
+                </a:solidFill>
                 <a:latin typeface="Calibri"/>
                 <a:ea typeface="Times New Roman"/>
               </a:rPr>
-              <a:t>nome_treinamento</a:t>
+              <a:t>portaria</a:t>
+            </a:r>
+            <a:r>
+              <a:rPr lang="pt-BR" sz="1200" b="1" u="none" strike="noStrike">
+                <a:solidFill>
+                  <a:srgbClr val="000000"/>
+                </a:solidFill>
+                <a:uFillTx/>
+                <a:latin typeface="Calibri"/>
+                <a:ea typeface="Times New Roman"/>
+              </a:rPr>
+              <a:t>_treinamento</a:t>
             </a:r>
             <a:r>
               <a:rPr lang="pt-BR" sz="1200" b="1" u="none" strike="noStrike" dirty="0">
@@ -4633,8 +4645,8 @@
         </p:nvSpPr>
         <p:spPr>
           <a:xfrm>
-            <a:off x="2657608" y="5722185"/>
-            <a:ext cx="4569605" cy="337100"/>
+            <a:off x="2666301" y="5652649"/>
+            <a:ext cx="4569605" cy="398655"/>
           </a:xfrm>
           <a:prstGeom prst="rect">
             <a:avLst/>
@@ -4687,13 +4699,9 @@
             </a:endParaRPr>
           </a:p>
           <a:p>
-            <a:pPr algn="ctr" defTabSz="914400">
-              <a:lnSpc>
-                <a:spcPct val="100000"/>
-              </a:lnSpc>
-            </a:pPr>
-            <a:r>
-              <a:rPr lang="es-ES" sz="1000" b="0" u="none" strike="noStrike" dirty="0">
+            <a:pPr algn="ctr"/>
+            <a:r>
+              <a:rPr lang="es-ES" sz="700" b="0" u="none" strike="noStrike">
                 <a:solidFill>
                   <a:srgbClr val="000000"/>
                 </a:solidFill>
@@ -4703,14 +4711,57 @@
               </a:rPr>
               <a:t>[contratante]</a:t>
             </a:r>
-            <a:endParaRPr lang="en-US" sz="1000" b="0" u="none" strike="noStrike" dirty="0">
+            <a:r>
+              <a:rPr lang="es-ES" sz="700">
+                <a:solidFill>
+                  <a:srgbClr val="000000"/>
+                </a:solidFill>
+                <a:latin typeface="Arial"/>
+                <a:ea typeface="Times New Roman"/>
+              </a:rPr>
+              <a:t> </a:t>
+            </a:r>
+            <a:endParaRPr lang="en-US" sz="700">
               <a:solidFill>
                 <a:srgbClr val="000000"/>
               </a:solidFill>
-              <a:uFillTx/>
               <a:latin typeface="Arial"/>
-              <a:cs typeface="Arial"/>
+              <a:ea typeface="Times New Roman"/>
             </a:endParaRPr>
+          </a:p>
+          <a:p>
+            <a:pPr algn="ctr"/>
+            <a:r>
+              <a:rPr lang="es-ES" sz="700" dirty="0">
+                <a:solidFill>
+                  <a:srgbClr val="000000"/>
+                </a:solidFill>
+                <a:latin typeface="Arial"/>
+                <a:ea typeface="Times New Roman"/>
+              </a:rPr>
+              <a:t>CNPJ: [</a:t>
+            </a:r>
+            <a:r>
+              <a:rPr lang="es-ES" sz="700" dirty="0" err="1">
+                <a:solidFill>
+                  <a:srgbClr val="000000"/>
+                </a:solidFill>
+                <a:latin typeface="Arial"/>
+                <a:ea typeface="Times New Roman"/>
+              </a:rPr>
+              <a:t>contratante_cnpj</a:t>
+            </a:r>
+            <a:r>
+              <a:rPr lang="es-ES" sz="700" dirty="0">
+                <a:solidFill>
+                  <a:srgbClr val="000000"/>
+                </a:solidFill>
+                <a:latin typeface="Arial"/>
+                <a:ea typeface="Times New Roman"/>
+              </a:rPr>
+              <a:t>]</a:t>
+            </a:r>
+            <a:endParaRPr lang="en-US" dirty="0"/>
           </a:p>
         </p:txBody>
       </p:sp>
@@ -4867,14 +4918,13 @@
               </a:lnSpc>
             </a:pPr>
             <a:r>
-              <a:rPr lang="pt-BR" sz="700" b="1" u="none" strike="noStrike" dirty="0">
+              <a:rPr lang="pt-BR" sz="700" b="1" dirty="0">
                 <a:solidFill>
                   <a:schemeClr val="dk1"/>
                 </a:solidFill>
-                <a:uFillTx/>
-                <a:latin typeface="Arial"/>
-              </a:rPr>
-              <a:t>INSTRUTOR</a:t>
+                <a:latin typeface="Arial"/>
+              </a:rPr>
+              <a:t>[assinatura_1]</a:t>
             </a:r>
             <a:endParaRPr lang="en-US" sz="700" b="0" u="none" strike="noStrike" dirty="0">
               <a:solidFill>
@@ -4967,14 +5017,13 @@
               <a:t>[</a:t>
             </a:r>
             <a:r>
-              <a:rPr lang="pt-BR" sz="800" b="1" u="none" strike="noStrike" err="1">
-                <a:solidFill>
-                  <a:srgbClr val="000000"/>
-                </a:solidFill>
-                <a:uFillTx/>
-                <a:latin typeface="Arial"/>
-              </a:rPr>
-              <a:t>nome_instrutor</a:t>
+              <a:rPr lang="pt-BR" sz="800" b="1" dirty="0">
+                <a:solidFill>
+                  <a:srgbClr val="000000"/>
+                </a:solidFill>
+                <a:latin typeface="Arial"/>
+              </a:rPr>
+              <a:t>nome1]</a:t>
             </a:r>
             <a:r>
               <a:rPr lang="pt-BR" sz="800" b="1" u="none" strike="noStrike" dirty="0">
@@ -4984,7 +5033,7 @@
                 <a:uFillTx/>
                 <a:latin typeface="Arial"/>
               </a:rPr>
-              <a:t>] </a:t>
+              <a:t> </a:t>
             </a:r>
             <a:endParaRPr lang="en-US" sz="800" b="0" u="none" strike="noStrike" dirty="0">
               <a:solidFill>
@@ -5012,26 +5061,15 @@
               <a:t>[</a:t>
             </a:r>
             <a:r>
-              <a:rPr lang="pt-BR" sz="800" b="0" u="none" strike="noStrike" err="1">
-                <a:solidFill>
-                  <a:srgbClr val="000000"/>
-                </a:solidFill>
-                <a:uFillTx/>
-                <a:latin typeface="Arial"/>
-              </a:rPr>
-              <a:t>formacao_instrutor</a:t>
-            </a:r>
-            <a:r>
-              <a:rPr lang="pt-BR" sz="800" b="0" u="none" strike="noStrike" dirty="0">
-                <a:solidFill>
-                  <a:srgbClr val="000000"/>
-                </a:solidFill>
-                <a:uFillTx/>
-                <a:latin typeface="Arial"/>
-              </a:rPr>
-              <a:t>]</a:t>
-            </a:r>
-            <a:endParaRPr lang="en-US" sz="800" b="0" u="none" strike="noStrike" dirty="0">
+              <a:rPr lang="pt-BR" sz="800" dirty="0">
+                <a:solidFill>
+                  <a:srgbClr val="000000"/>
+                </a:solidFill>
+                <a:latin typeface="Arial"/>
+              </a:rPr>
+              <a:t>qualificação_profissional1]</a:t>
+            </a:r>
+            <a:endParaRPr lang="pt-BR" sz="800" b="0" u="none" strike="noStrike" dirty="0">
               <a:solidFill>
                 <a:srgbClr val="000000"/>
               </a:solidFill>
@@ -5057,14 +5095,32 @@
               <a:t> [</a:t>
             </a:r>
             <a:r>
-              <a:rPr lang="pt-BR" sz="800" b="0" u="none" strike="noStrike" err="1">
-                <a:solidFill>
-                  <a:srgbClr val="000000"/>
-                </a:solidFill>
-                <a:uFillTx/>
-                <a:latin typeface="Arial"/>
-              </a:rPr>
-              <a:t>matricula_instrutor</a:t>
+              <a:rPr lang="pt-BR" sz="800" dirty="0">
+                <a:solidFill>
+                  <a:srgbClr val="000000"/>
+                </a:solidFill>
+                <a:latin typeface="Arial"/>
+              </a:rPr>
+              <a:t>registro</a:t>
+            </a:r>
+            <a:r>
+              <a:rPr lang="pt-BR" sz="800" b="0" u="none" strike="noStrike" dirty="0">
+                <a:solidFill>
+                  <a:srgbClr val="000000"/>
+                </a:solidFill>
+                <a:uFillTx/>
+                <a:latin typeface="Arial"/>
+              </a:rPr>
+              <a:t>_</a:t>
+            </a:r>
+            <a:r>
+              <a:rPr lang="pt-BR" sz="800" dirty="0">
+                <a:solidFill>
+                  <a:srgbClr val="000000"/>
+                </a:solidFill>
+                <a:latin typeface="Arial"/>
+              </a:rPr>
+              <a:t>qualificação1</a:t>
             </a:r>
             <a:r>
               <a:rPr lang="pt-BR" sz="800" b="0" u="none" strike="noStrike" dirty="0">
@@ -5094,7 +5150,7 @@
           <p:nvPr>
             <p:extLst>
               <p:ext uri="{D42A27DB-BD31-4B8C-83A1-F6EECF244321}">
-                <p14:modId xmlns:p14="http://schemas.microsoft.com/office/powerpoint/2010/main" val="2529654253"/>
+                <p14:modId xmlns:p14="http://schemas.microsoft.com/office/powerpoint/2010/main" val="950695353"/>
               </p:ext>
             </p:extLst>
           </p:nvPr>
@@ -5135,7 +5191,67 @@
                           <a:uFillTx/>
                           <a:latin typeface="Arial"/>
                         </a:rPr>
-                        <a:t>METODOLOGIA DE ENSINO PRESENCIAL - TEÓRICO E PRÁTICO – [</a:t>
+                        <a:t>METODOLOGIA DE ENSINO [</a:t>
+                      </a:r>
+                      <a:r>
+                        <a:rPr lang="pt-BR" sz="900" b="1" i="0" u="none" strike="noStrike" noProof="0" dirty="0">
+                          <a:solidFill>
+                            <a:srgbClr val="000000"/>
+                          </a:solidFill>
+                          <a:uFillTx/>
+                          <a:latin typeface="Arial"/>
+                        </a:rPr>
+                        <a:t>modalidade</a:t>
+                      </a:r>
+                      <a:r>
+                        <a:rPr lang="pt-BR" sz="1200" b="1" i="0" u="none" strike="noStrike" noProof="0" dirty="0">
+                          <a:solidFill>
+                            <a:srgbClr val="000000"/>
+                          </a:solidFill>
+                          <a:uFillTx/>
+                          <a:latin typeface="Arial"/>
+                        </a:rPr>
+                        <a:t>]</a:t>
+                      </a:r>
+                      <a:r>
+                        <a:rPr lang="pt-BR" sz="900" b="1" u="none" strike="noStrike" dirty="0">
+                          <a:solidFill>
+                            <a:schemeClr val="dk1"/>
+                          </a:solidFill>
+                          <a:uFillTx/>
+                          <a:latin typeface="Arial"/>
+                        </a:rPr>
+                        <a:t>- [</a:t>
+                      </a:r>
+                      <a:r>
+                        <a:rPr lang="pt-BR" sz="900" b="1" i="0" u="none" strike="noStrike" noProof="0" dirty="0">
+                          <a:solidFill>
+                            <a:srgbClr val="000000"/>
+                          </a:solidFill>
+                          <a:uFillTx/>
+                          <a:latin typeface="Arial"/>
+                        </a:rPr>
+                        <a:t>metodologia</a:t>
+                      </a:r>
+                      <a:r>
+                        <a:rPr lang="pt-BR" sz="1200" b="1" i="0" u="none" strike="noStrike" noProof="0" dirty="0">
+                          <a:solidFill>
+                            <a:srgbClr val="000000"/>
+                          </a:solidFill>
+                          <a:uFillTx/>
+                          <a:latin typeface="Arial"/>
+                        </a:rPr>
+                        <a:t>]</a:t>
+                      </a:r>
+                      <a:r>
+                        <a:rPr lang="pt-BR" sz="900" b="1" u="none" strike="noStrike" dirty="0">
+                          <a:solidFill>
+                            <a:schemeClr val="dk1"/>
+                          </a:solidFill>
+                          <a:uFillTx/>
+                          <a:latin typeface="Arial"/>
+                        </a:rPr>
+                        <a:t> – [</a:t>
                       </a:r>
                       <a:r>
                         <a:rPr lang="pt-BR" sz="900" b="1" u="none" strike="noStrike" dirty="0" err="1">
@@ -5165,17 +5281,17 @@
                           <a:uFillTx/>
                           <a:latin typeface="Arial"/>
                         </a:rPr>
-                        <a:t>] - [</a:t>
+                        <a:t>] - C.H [</a:t>
                       </a:r>
                       <a:r>
-                        <a:rPr lang="pt-BR" sz="1000" b="0" i="0" u="none" strike="noStrike" noProof="0" dirty="0" err="1">
+                        <a:rPr lang="pt-BR" sz="1000" b="1" i="0" u="none" strike="noStrike" noProof="0" dirty="0" err="1">
                           <a:solidFill>
                             <a:srgbClr val="000000"/>
                           </a:solidFill>
                           <a:uFillTx/>
                           <a:latin typeface="Arial"/>
                         </a:rPr>
-                        <a:t>carga_hora</a:t>
+                        <a:t>carga_horaria</a:t>
                       </a:r>
                       <a:r>
                         <a:rPr lang="pt-BR" sz="900" b="1" u="none" strike="noStrike" dirty="0">
@@ -5252,14 +5368,14 @@
                         <a:t>[</a:t>
                       </a:r>
                       <a:r>
-                        <a:rPr lang="pt-BR" sz="1200" b="0" u="none" strike="noStrike" dirty="0" err="1">
+                        <a:rPr lang="pt-BR" sz="1000" b="1" i="0" u="none" strike="noStrike" noProof="0" dirty="0" err="1">
                           <a:solidFill>
                             <a:srgbClr val="000000"/>
                           </a:solidFill>
                           <a:uFillTx/>
                           <a:latin typeface="Arial"/>
                         </a:rPr>
-                        <a:t>descricao</a:t>
+                        <a:t>conteudo</a:t>
                       </a:r>
                       <a:r>
                         <a:rPr lang="pt-BR" sz="1200" b="0" u="none" strike="noStrike" dirty="0">
@@ -5364,14 +5480,73 @@
               </a:lnSpc>
             </a:pPr>
             <a:r>
-              <a:rPr lang="pt-BR" sz="700" b="1" u="none" strike="noStrike" dirty="0">
+              <a:rPr lang="pt-BR" sz="700" b="1" dirty="0">
                 <a:solidFill>
                   <a:schemeClr val="dk1"/>
                 </a:solidFill>
-                <a:uFillTx/>
-                <a:latin typeface="Arial"/>
-              </a:rPr>
-              <a:t>RESPONSÁVEL TÉCNICA DA CAPACITAÇÃO</a:t>
+                <a:latin typeface="Arial"/>
+              </a:rPr>
+              <a:t>[assinatura_2]</a:t>
+            </a:r>
+            <a:endParaRPr lang="pt-BR" dirty="0"/>
+          </a:p>
+          <a:p>
+            <a:pPr defTabSz="914400">
+              <a:lnSpc>
+                <a:spcPct val="100000"/>
+              </a:lnSpc>
+            </a:pPr>
+            <a:endParaRPr lang="en-US" sz="700" b="0" u="none" strike="noStrike">
+              <a:solidFill>
+                <a:srgbClr val="000000"/>
+              </a:solidFill>
+              <a:uFillTx/>
+              <a:latin typeface="Arial"/>
+            </a:endParaRPr>
+          </a:p>
+          <a:p>
+            <a:pPr defTabSz="914400">
+              <a:lnSpc>
+                <a:spcPct val="100000"/>
+              </a:lnSpc>
+            </a:pPr>
+            <a:endParaRPr lang="en-US" sz="700" b="0" u="none" strike="noStrike">
+              <a:solidFill>
+                <a:srgbClr val="000000"/>
+              </a:solidFill>
+              <a:uFillTx/>
+              <a:latin typeface="Arial"/>
+            </a:endParaRPr>
+          </a:p>
+          <a:p>
+            <a:pPr defTabSz="914400">
+              <a:lnSpc>
+                <a:spcPct val="100000"/>
+              </a:lnSpc>
+            </a:pPr>
+            <a:endParaRPr lang="en-US" sz="700" b="0" u="none" strike="noStrike">
+              <a:solidFill>
+                <a:srgbClr val="000000"/>
+              </a:solidFill>
+              <a:uFillTx/>
+              <a:latin typeface="Arial"/>
+            </a:endParaRPr>
+          </a:p>
+          <a:p>
+            <a:pPr algn="ctr" defTabSz="914400">
+              <a:lnSpc>
+                <a:spcPct val="100000"/>
+              </a:lnSpc>
+            </a:pPr>
+            <a:r>
+              <a:rPr lang="pt-BR" sz="700" b="0" u="none" strike="noStrike" dirty="0">
+                <a:solidFill>
+                  <a:schemeClr val="dk1"/>
+                </a:solidFill>
+                <a:uFillTx/>
+                <a:latin typeface="Arial"/>
+              </a:rPr>
+              <a:t>_________________________________________</a:t>
             </a:r>
             <a:endParaRPr lang="en-US" sz="700" b="0" u="none" strike="noStrike" dirty="0">
               <a:solidFill>
@@ -5382,109 +5557,31 @@
             </a:endParaRPr>
           </a:p>
           <a:p>
-            <a:pPr defTabSz="914400">
-              <a:lnSpc>
-                <a:spcPct val="100000"/>
-              </a:lnSpc>
-            </a:pPr>
-            <a:endParaRPr lang="en-US" sz="700" b="0" u="none" strike="noStrike">
-              <a:solidFill>
-                <a:srgbClr val="000000"/>
-              </a:solidFill>
-              <a:uFillTx/>
-              <a:latin typeface="Arial"/>
-            </a:endParaRPr>
-          </a:p>
-          <a:p>
-            <a:pPr defTabSz="914400">
-              <a:lnSpc>
-                <a:spcPct val="100000"/>
-              </a:lnSpc>
-            </a:pPr>
-            <a:endParaRPr lang="en-US" sz="700" b="0" u="none" strike="noStrike">
-              <a:solidFill>
-                <a:srgbClr val="000000"/>
-              </a:solidFill>
-              <a:uFillTx/>
-              <a:latin typeface="Arial"/>
-            </a:endParaRPr>
-          </a:p>
-          <a:p>
-            <a:pPr defTabSz="914400">
-              <a:lnSpc>
-                <a:spcPct val="100000"/>
-              </a:lnSpc>
-            </a:pPr>
-            <a:endParaRPr lang="en-US" sz="700" b="0" u="none" strike="noStrike">
-              <a:solidFill>
-                <a:srgbClr val="000000"/>
-              </a:solidFill>
-              <a:uFillTx/>
-              <a:latin typeface="Arial"/>
-            </a:endParaRPr>
-          </a:p>
-          <a:p>
             <a:pPr algn="ctr" defTabSz="914400">
               <a:lnSpc>
                 <a:spcPct val="100000"/>
               </a:lnSpc>
             </a:pPr>
             <a:r>
-              <a:rPr lang="pt-BR" sz="700" b="0" u="none" strike="noStrike" dirty="0">
+              <a:rPr lang="pt-BR" sz="800" b="1" u="none" strike="noStrike" dirty="0">
                 <a:solidFill>
                   <a:schemeClr val="dk1"/>
                 </a:solidFill>
                 <a:uFillTx/>
                 <a:latin typeface="Arial"/>
-              </a:rPr>
-              <a:t>_________________________________________</a:t>
-            </a:r>
-            <a:endParaRPr lang="en-US" sz="700" b="0" u="none" strike="noStrike" dirty="0">
-              <a:solidFill>
-                <a:schemeClr val="dk1"/>
-              </a:solidFill>
-              <a:uFillTx/>
-              <a:latin typeface="Arial"/>
-            </a:endParaRPr>
-          </a:p>
-          <a:p>
-            <a:pPr algn="ctr" defTabSz="914400">
-              <a:lnSpc>
-                <a:spcPct val="100000"/>
-              </a:lnSpc>
-            </a:pPr>
-            <a:r>
-              <a:rPr lang="pt-BR" sz="800" b="1" u="none" strike="noStrike" dirty="0">
+                <a:ea typeface="Times New Roman"/>
+              </a:rPr>
+              <a:t>[</a:t>
+            </a:r>
+            <a:r>
+              <a:rPr lang="pt-BR" sz="800" b="1" dirty="0">
                 <a:solidFill>
                   <a:schemeClr val="dk1"/>
                 </a:solidFill>
-                <a:uFillTx/>
                 <a:latin typeface="Arial"/>
                 <a:ea typeface="Times New Roman"/>
               </a:rPr>
-              <a:t>[</a:t>
-            </a:r>
-            <a:r>
-              <a:rPr lang="pt-BR" sz="800" b="1" u="none" strike="noStrike" err="1">
-                <a:solidFill>
-                  <a:schemeClr val="dk1"/>
-                </a:solidFill>
-                <a:uFillTx/>
-                <a:latin typeface="Arial"/>
-                <a:ea typeface="Times New Roman"/>
-              </a:rPr>
-              <a:t>nome_responsavel_tecnico</a:t>
-            </a:r>
-            <a:r>
-              <a:rPr lang="pt-BR" sz="800" b="1" u="none" strike="noStrike" dirty="0">
-                <a:solidFill>
-                  <a:schemeClr val="dk1"/>
-                </a:solidFill>
-                <a:uFillTx/>
-                <a:latin typeface="Arial"/>
-                <a:ea typeface="Times New Roman"/>
-              </a:rPr>
-              <a:t>]</a:t>
+              <a:t>nome2]</a:t>
             </a:r>
             <a:endParaRPr lang="en-US" sz="800" b="0" u="none" strike="noStrike" dirty="0">
               <a:solidFill>
@@ -5496,6 +5593,59 @@
             </a:endParaRPr>
           </a:p>
           <a:p>
+            <a:pPr algn="ctr"/>
+            <a:r>
+              <a:rPr lang="pt-BR" sz="800" dirty="0">
+                <a:solidFill>
+                  <a:schemeClr val="dk1"/>
+                </a:solidFill>
+                <a:latin typeface="Arial"/>
+                <a:ea typeface="Times New Roman"/>
+              </a:rPr>
+              <a:t>[qualificação</a:t>
+            </a:r>
+            <a:r>
+              <a:rPr lang="pt-BR" sz="800" b="0" u="none" strike="noStrike" dirty="0">
+                <a:solidFill>
+                  <a:schemeClr val="dk1"/>
+                </a:solidFill>
+                <a:uFillTx/>
+                <a:latin typeface="Arial"/>
+                <a:ea typeface="Times New Roman"/>
+              </a:rPr>
+              <a:t>_</a:t>
+            </a:r>
+            <a:r>
+              <a:rPr lang="pt-BR" sz="800" dirty="0">
+                <a:solidFill>
+                  <a:schemeClr val="dk1"/>
+                </a:solidFill>
+                <a:latin typeface="Arial"/>
+                <a:ea typeface="Times New Roman"/>
+              </a:rPr>
+              <a:t>profissional2</a:t>
+            </a:r>
+            <a:r>
+              <a:rPr lang="pt-BR" sz="800" b="0" u="none" strike="noStrike" dirty="0">
+                <a:solidFill>
+                  <a:schemeClr val="dk1"/>
+                </a:solidFill>
+                <a:uFillTx/>
+                <a:latin typeface="Arial"/>
+                <a:ea typeface="Times New Roman"/>
+              </a:rPr>
+              <a:t>]</a:t>
+            </a:r>
+            <a:endParaRPr lang="pt-BR" sz="800" dirty="0">
+              <a:solidFill>
+                <a:schemeClr val="dk1"/>
+              </a:solidFill>
+              <a:latin typeface="Arial"/>
+              <a:ea typeface="Times New Roman"/>
+              <a:cs typeface="Arial"/>
+            </a:endParaRPr>
+          </a:p>
+          <a:p>
             <a:pPr algn="ctr" defTabSz="914400">
               <a:lnSpc>
                 <a:spcPct val="100000"/>
@@ -5513,15 +5663,14 @@
               <a:t>[</a:t>
             </a:r>
             <a:r>
-              <a:rPr lang="pt-BR" sz="800" b="0" u="none" strike="noStrike" err="1">
+              <a:rPr lang="pt-BR" sz="800" dirty="0">
                 <a:solidFill>
                   <a:schemeClr val="dk1"/>
                 </a:solidFill>
-                <a:uFillTx/>
                 <a:latin typeface="Arial"/>
                 <a:ea typeface="Times New Roman"/>
               </a:rPr>
-              <a:t>formacao_responsavel_tecnico</a:t>
+              <a:t>registro</a:t>
             </a:r>
             <a:r>
               <a:rPr lang="pt-BR" sz="800" b="0" u="none" strike="noStrike" dirty="0">
@@ -5532,63 +5681,33 @@
                 <a:latin typeface="Arial"/>
                 <a:ea typeface="Times New Roman"/>
               </a:rPr>
+              <a:t>_</a:t>
+            </a:r>
+            <a:r>
+              <a:rPr lang="pt-BR" sz="800" dirty="0">
+                <a:solidFill>
+                  <a:schemeClr val="dk1"/>
+                </a:solidFill>
+                <a:latin typeface="Arial"/>
+                <a:ea typeface="Times New Roman"/>
+              </a:rPr>
+              <a:t>qualificação2</a:t>
+            </a:r>
+            <a:r>
+              <a:rPr lang="pt-BR" sz="800" b="0" u="none" strike="noStrike" dirty="0">
+                <a:solidFill>
+                  <a:schemeClr val="dk1"/>
+                </a:solidFill>
+                <a:uFillTx/>
+                <a:latin typeface="Arial"/>
+                <a:ea typeface="Times New Roman"/>
+              </a:rPr>
               <a:t>]</a:t>
             </a:r>
-            <a:endParaRPr lang="en-US" sz="800" b="0" u="none" strike="noStrike" dirty="0">
+            <a:endParaRPr lang="en-US" dirty="0">
               <a:solidFill>
                 <a:schemeClr val="dk1"/>
               </a:solidFill>
-              <a:uFillTx/>
-              <a:latin typeface="Arial"/>
-              <a:cs typeface="Arial"/>
-            </a:endParaRPr>
-          </a:p>
-          <a:p>
-            <a:pPr algn="ctr" defTabSz="914400">
-              <a:lnSpc>
-                <a:spcPct val="100000"/>
-              </a:lnSpc>
-            </a:pPr>
-            <a:r>
-              <a:rPr lang="pt-BR" sz="800" b="0" u="none" strike="noStrike" dirty="0">
-                <a:solidFill>
-                  <a:schemeClr val="dk1"/>
-                </a:solidFill>
-                <a:uFillTx/>
-                <a:latin typeface="Arial"/>
-                <a:ea typeface="Times New Roman"/>
-              </a:rPr>
-              <a:t>[</a:t>
-            </a:r>
-            <a:r>
-              <a:rPr lang="pt-BR" sz="800" b="0" u="none" strike="noStrike" err="1">
-                <a:solidFill>
-                  <a:schemeClr val="dk1"/>
-                </a:solidFill>
-                <a:uFillTx/>
-                <a:latin typeface="Arial"/>
-                <a:ea typeface="Times New Roman"/>
-              </a:rPr>
-              <a:t>crea_responsavel_tecnico</a:t>
-            </a:r>
-            <a:r>
-              <a:rPr lang="pt-BR" sz="800" b="0" u="none" strike="noStrike" dirty="0">
-                <a:solidFill>
-                  <a:schemeClr val="dk1"/>
-                </a:solidFill>
-                <a:uFillTx/>
-                <a:latin typeface="Arial"/>
-                <a:ea typeface="Times New Roman"/>
-              </a:rPr>
-              <a:t>]</a:t>
-            </a:r>
-            <a:endParaRPr lang="en-US" sz="800" b="0" u="none" strike="noStrike" dirty="0">
-              <a:solidFill>
-                <a:schemeClr val="dk1"/>
-              </a:solidFill>
-              <a:uFillTx/>
-              <a:latin typeface="Arial"/>
-              <a:cs typeface="Arial"/>
             </a:endParaRPr>
           </a:p>
         </p:txBody>

</xml_diff>

<commit_message>
fix: update Usuarios and Treinamentos components for better user feedback and add new styles in CSS
</commit_message>
<xml_diff>
--- a/public/templates/frente-verso-2a.pptx
+++ b/public/templates/frente-verso-2a.pptx
@@ -113,8 +113,7 @@
 <file path=ppt/revisionInfo.xml><?xml version="1.0" encoding="utf-8"?>
 <p1510:revInfo xmlns:a="http://schemas.openxmlformats.org/drawingml/2006/main" xmlns:r="http://schemas.openxmlformats.org/officeDocument/2006/relationships" xmlns:p1510="http://schemas.microsoft.com/office/powerpoint/2015/10/main">
   <p1510:revLst>
-    <p1510:client id="{23E2F1ED-B1E5-4AE6-A728-F30967A2B5D1}" v="34" dt="2025-01-05T20:20:39.285"/>
-    <p1510:client id="{7F77D108-246B-40A1-8CB4-174B7842DCA7}" v="206" dt="2025-01-03T23:52:52.406"/>
+    <p1510:client id="{305F875D-1E47-4FFC-AB99-9015F97A9EA6}" v="34" dt="2025-02-04T13:19:09.435"/>
   </p1510:revLst>
 </p1510:revInfo>
 </file>
@@ -4232,7 +4231,7 @@
               </a:lnSpc>
             </a:pPr>
             <a:r>
-              <a:rPr lang="pt-BR" sz="900" b="0" u="none" strike="noStrike">
+              <a:rPr lang="pt-BR" sz="900" b="0" u="none" strike="noStrike" dirty="0">
                 <a:solidFill>
                   <a:schemeClr val="dk1"/>
                 </a:solidFill>
@@ -4242,7 +4241,7 @@
               <a:t>Código do Certificado: </a:t>
             </a:r>
             <a:r>
-              <a:rPr lang="pt-BR" sz="900" b="1" u="none" strike="noStrike">
+              <a:rPr lang="pt-BR" sz="900" b="1" u="none" strike="noStrike" dirty="0">
                 <a:solidFill>
                   <a:schemeClr val="dk1"/>
                 </a:solidFill>
@@ -4252,16 +4251,35 @@
               <a:t>LF</a:t>
             </a:r>
             <a:r>
-              <a:rPr lang="pt-BR" sz="900" b="1" u="none" strike="noStrike">
-                <a:solidFill>
-                  <a:srgbClr val="000000"/>
-                </a:solidFill>
-                <a:uFillTx/>
-                <a:latin typeface="Arial"/>
-              </a:rPr>
-              <a:t>STS  [codigo]/2024</a:t>
-            </a:r>
-            <a:endParaRPr lang="en-US" sz="900" b="0" u="none" strike="noStrike">
+              <a:rPr lang="pt-BR" sz="900" b="1" u="none" strike="noStrike" dirty="0">
+                <a:solidFill>
+                  <a:srgbClr val="000000"/>
+                </a:solidFill>
+                <a:uFillTx/>
+                <a:latin typeface="Arial"/>
+              </a:rPr>
+              <a:t>STS  [</a:t>
+            </a:r>
+            <a:r>
+              <a:rPr lang="pt-BR" sz="900" b="1" u="none" strike="noStrike" dirty="0" err="1">
+                <a:solidFill>
+                  <a:srgbClr val="000000"/>
+                </a:solidFill>
+                <a:uFillTx/>
+                <a:latin typeface="Arial"/>
+              </a:rPr>
+              <a:t>codigo</a:t>
+            </a:r>
+            <a:r>
+              <a:rPr lang="pt-BR" sz="900" b="1" dirty="0">
+                <a:solidFill>
+                  <a:srgbClr val="000000"/>
+                </a:solidFill>
+                <a:latin typeface="Arial"/>
+              </a:rPr>
+              <a:t>]</a:t>
+            </a:r>
+            <a:endParaRPr lang="en-US" sz="900" b="0" u="none" strike="noStrike" dirty="0">
               <a:solidFill>
                 <a:srgbClr val="000000"/>
               </a:solidFill>
@@ -4533,7 +4551,7 @@
         <p:spPr>
           <a:xfrm>
             <a:off x="2266560" y="538920"/>
-            <a:ext cx="6958440" cy="668880"/>
+            <a:ext cx="6958440" cy="521766"/>
           </a:xfrm>
           <a:prstGeom prst="rect">
             <a:avLst/>
@@ -4567,15 +4585,36 @@
               </a:lnSpc>
             </a:pPr>
             <a:r>
-              <a:rPr lang="pt-BR" sz="2400" b="1">
+              <a:rPr lang="pt-BR" sz="1600" b="1" dirty="0">
                 <a:solidFill>
                   <a:srgbClr val="000000"/>
                 </a:solidFill>
                 <a:latin typeface="Calibri"/>
               </a:rPr>
-              <a:t>[titulo_treinamento]</a:t>
-            </a:r>
-            <a:endParaRPr lang="pt-BR"/>
+              <a:t>[</a:t>
+            </a:r>
+            <a:r>
+              <a:rPr lang="pt-BR" sz="1600" b="1" dirty="0" err="1">
+                <a:solidFill>
+                  <a:srgbClr val="000000"/>
+                </a:solidFill>
+                <a:latin typeface="Calibri"/>
+              </a:rPr>
+              <a:t>titulo_treinamento</a:t>
+            </a:r>
+            <a:r>
+              <a:rPr lang="pt-BR" sz="1600" b="1" dirty="0">
+                <a:solidFill>
+                  <a:srgbClr val="000000"/>
+                </a:solidFill>
+                <a:latin typeface="Calibri"/>
+              </a:rPr>
+              <a:t>]</a:t>
+            </a:r>
+            <a:endParaRPr lang="pt-BR" sz="1600">
+              <a:ea typeface="Calibri"/>
+              <a:cs typeface="Calibri"/>
+            </a:endParaRPr>
           </a:p>
           <a:p>
             <a:pPr algn="ctr" defTabSz="914400">
@@ -4584,7 +4623,7 @@
               </a:lnSpc>
             </a:pPr>
             <a:r>
-              <a:rPr lang="pt-BR" sz="1200" b="1" u="none" strike="noStrike">
+              <a:rPr lang="pt-BR" sz="1200" b="1" u="none" strike="noStrike" dirty="0">
                 <a:solidFill>
                   <a:srgbClr val="000000"/>
                 </a:solidFill>
@@ -4595,7 +4634,7 @@
               <a:t>[</a:t>
             </a:r>
             <a:r>
-              <a:rPr lang="pt-BR" sz="1200" b="1">
+              <a:rPr lang="pt-BR" sz="1200" b="1" dirty="0" err="1">
                 <a:solidFill>
                   <a:srgbClr val="000000"/>
                 </a:solidFill>
@@ -4605,7 +4644,7 @@
               <a:t>portaria</a:t>
             </a:r>
             <a:r>
-              <a:rPr lang="pt-BR" sz="1200" b="1" u="none" strike="noStrike">
+              <a:rPr lang="pt-BR" sz="1200" b="1" u="none" strike="noStrike" dirty="0" err="1">
                 <a:solidFill>
                   <a:srgbClr val="000000"/>
                 </a:solidFill>
@@ -5150,7 +5189,7 @@
           <p:nvPr>
             <p:extLst>
               <p:ext uri="{D42A27DB-BD31-4B8C-83A1-F6EECF244321}">
-                <p14:modId xmlns:p14="http://schemas.microsoft.com/office/powerpoint/2010/main" val="950695353"/>
+                <p14:modId xmlns:p14="http://schemas.microsoft.com/office/powerpoint/2010/main" val="856349569"/>
               </p:ext>
             </p:extLst>
           </p:nvPr>
@@ -5368,7 +5407,7 @@
                         <a:t>[</a:t>
                       </a:r>
                       <a:r>
-                        <a:rPr lang="pt-BR" sz="1000" b="1" i="0" u="none" strike="noStrike" noProof="0" dirty="0" err="1">
+                        <a:rPr lang="pt-BR" sz="1000" b="0" i="0" u="none" strike="noStrike" noProof="0" err="1">
                           <a:solidFill>
                             <a:srgbClr val="000000"/>
                           </a:solidFill>
@@ -5387,7 +5426,7 @@
                         </a:rPr>
                         <a:t>]</a:t>
                       </a:r>
-                      <a:endParaRPr lang="en-US" sz="1200" b="0" u="none" strike="noStrike" dirty="0">
+                      <a:endParaRPr lang="en-US" sz="1200" b="0" u="none" strike="noStrike">
                         <a:solidFill>
                           <a:srgbClr val="000000"/>
                         </a:solidFill>

</xml_diff>